<commit_message>
Update Machine Learning 개념과 종류.pptx
2020.10.13 지도/비지도학습 외 ML 종류 정리
</commit_message>
<xml_diff>
--- a/Machine Learning 개념과 종류.pptx
+++ b/Machine Learning 개념과 종류.pptx
@@ -5,12 +5,17 @@
     <p:sldMasterId id="2147483672" r:id="rId1"/>
   </p:sldMasterIdLst>
   <p:notesMasterIdLst>
-    <p:notesMasterId r:id="rId5"/>
+    <p:notesMasterId r:id="rId10"/>
   </p:notesMasterIdLst>
   <p:sldIdLst>
     <p:sldId id="258" r:id="rId2"/>
     <p:sldId id="259" r:id="rId3"/>
     <p:sldId id="260" r:id="rId4"/>
+    <p:sldId id="261" r:id="rId5"/>
+    <p:sldId id="262" r:id="rId6"/>
+    <p:sldId id="263" r:id="rId7"/>
+    <p:sldId id="264" r:id="rId8"/>
+    <p:sldId id="265" r:id="rId9"/>
   </p:sldIdLst>
   <p:sldSz cx="9144000" cy="6858000" type="screen4x3"/>
   <p:notesSz cx="6858000" cy="9144000"/>
@@ -194,7 +199,7 @@
           <a:p>
             <a:fld id="{693111F3-E7F7-4110-B747-A18B068C936E}" type="datetimeFigureOut">
               <a:rPr lang="ko-KR" altLang="en-US" smtClean="0"/>
-              <a:t>2020-10-12</a:t>
+              <a:t>2020-10-13</a:t>
             </a:fld>
             <a:endParaRPr lang="ko-KR" altLang="en-US"/>
           </a:p>
@@ -605,7 +610,7 @@
           <a:p>
             <a:fld id="{426225CE-111E-4274-8066-27895E711E53}" type="datetimeFigureOut">
               <a:rPr lang="ko-KR" altLang="en-US" smtClean="0"/>
-              <a:t>2020-10-12</a:t>
+              <a:t>2020-10-13</a:t>
             </a:fld>
             <a:endParaRPr lang="ko-KR" altLang="en-US"/>
           </a:p>
@@ -964,7 +969,7 @@
           <a:p>
             <a:fld id="{426225CE-111E-4274-8066-27895E711E53}" type="datetimeFigureOut">
               <a:rPr lang="ko-KR" altLang="en-US" smtClean="0"/>
-              <a:t>2020-10-12</a:t>
+              <a:t>2020-10-13</a:t>
             </a:fld>
             <a:endParaRPr lang="ko-KR" altLang="en-US"/>
           </a:p>
@@ -1139,7 +1144,7 @@
           <a:p>
             <a:fld id="{426225CE-111E-4274-8066-27895E711E53}" type="datetimeFigureOut">
               <a:rPr lang="ko-KR" altLang="en-US" smtClean="0"/>
-              <a:t>2020-10-12</a:t>
+              <a:t>2020-10-13</a:t>
             </a:fld>
             <a:endParaRPr lang="ko-KR" altLang="en-US"/>
           </a:p>
@@ -1374,7 +1379,7 @@
           <a:p>
             <a:fld id="{426225CE-111E-4274-8066-27895E711E53}" type="datetimeFigureOut">
               <a:rPr lang="ko-KR" altLang="en-US" smtClean="0"/>
-              <a:t>2020-10-12</a:t>
+              <a:t>2020-10-13</a:t>
             </a:fld>
             <a:endParaRPr lang="ko-KR" altLang="en-US"/>
           </a:p>
@@ -1643,7 +1648,7 @@
           <a:p>
             <a:fld id="{426225CE-111E-4274-8066-27895E711E53}" type="datetimeFigureOut">
               <a:rPr lang="ko-KR" altLang="en-US" smtClean="0"/>
-              <a:t>2020-10-12</a:t>
+              <a:t>2020-10-13</a:t>
             </a:fld>
             <a:endParaRPr lang="ko-KR" altLang="en-US"/>
           </a:p>
@@ -1863,7 +1868,7 @@
           <a:p>
             <a:fld id="{426225CE-111E-4274-8066-27895E711E53}" type="datetimeFigureOut">
               <a:rPr lang="ko-KR" altLang="en-US" smtClean="0"/>
-              <a:t>2020-10-12</a:t>
+              <a:t>2020-10-13</a:t>
             </a:fld>
             <a:endParaRPr lang="ko-KR" altLang="en-US"/>
           </a:p>
@@ -2215,7 +2220,7 @@
           <a:p>
             <a:fld id="{426225CE-111E-4274-8066-27895E711E53}" type="datetimeFigureOut">
               <a:rPr lang="ko-KR" altLang="en-US" smtClean="0"/>
-              <a:t>2020-10-12</a:t>
+              <a:t>2020-10-13</a:t>
             </a:fld>
             <a:endParaRPr lang="ko-KR" altLang="en-US"/>
           </a:p>
@@ -2447,7 +2452,7 @@
           <a:p>
             <a:fld id="{426225CE-111E-4274-8066-27895E711E53}" type="datetimeFigureOut">
               <a:rPr lang="ko-KR" altLang="en-US" smtClean="0"/>
-              <a:t>2020-10-12</a:t>
+              <a:t>2020-10-13</a:t>
             </a:fld>
             <a:endParaRPr lang="ko-KR" altLang="en-US"/>
           </a:p>
@@ -2587,7 +2592,7 @@
           <a:p>
             <a:fld id="{426225CE-111E-4274-8066-27895E711E53}" type="datetimeFigureOut">
               <a:rPr lang="ko-KR" altLang="en-US" smtClean="0"/>
-              <a:t>2020-10-12</a:t>
+              <a:t>2020-10-13</a:t>
             </a:fld>
             <a:endParaRPr lang="ko-KR" altLang="en-US"/>
           </a:p>
@@ -2864,7 +2869,7 @@
           <a:p>
             <a:fld id="{426225CE-111E-4274-8066-27895E711E53}" type="datetimeFigureOut">
               <a:rPr lang="ko-KR" altLang="en-US" smtClean="0"/>
-              <a:t>2020-10-12</a:t>
+              <a:t>2020-10-13</a:t>
             </a:fld>
             <a:endParaRPr lang="ko-KR" altLang="en-US"/>
           </a:p>
@@ -3271,7 +3276,7 @@
           <a:p>
             <a:fld id="{426225CE-111E-4274-8066-27895E711E53}" type="datetimeFigureOut">
               <a:rPr lang="ko-KR" altLang="en-US" smtClean="0"/>
-              <a:t>2020-10-12</a:t>
+              <a:t>2020-10-13</a:t>
             </a:fld>
             <a:endParaRPr lang="ko-KR" altLang="en-US"/>
           </a:p>
@@ -3609,7 +3614,7 @@
           <a:p>
             <a:fld id="{426225CE-111E-4274-8066-27895E711E53}" type="datetimeFigureOut">
               <a:rPr lang="ko-KR" altLang="en-US" smtClean="0"/>
-              <a:t>2020-10-12</a:t>
+              <a:t>2020-10-13</a:t>
             </a:fld>
             <a:endParaRPr lang="ko-KR" altLang="en-US"/>
           </a:p>
@@ -4691,8 +4696,8 @@
           </a:p>
         </p:txBody>
       </p:sp>
-      <mc:AlternateContent xmlns:mc="http://schemas.openxmlformats.org/markup-compatibility/2006">
-        <mc:Choice xmlns:a14="http://schemas.microsoft.com/office/drawing/2010/main" Requires="a14">
+      <mc:AlternateContent xmlns:mc="http://schemas.openxmlformats.org/markup-compatibility/2006" xmlns:a14="http://schemas.microsoft.com/office/drawing/2010/main">
+        <mc:Choice Requires="a14">
           <p:sp>
             <p:nvSpPr>
               <p:cNvPr id="3" name="내용 개체 틀 2"/>
@@ -5430,7 +5435,7 @@
             </p:txBody>
           </p:sp>
         </mc:Choice>
-        <mc:Fallback>
+        <mc:Fallback xmlns="">
           <p:sp>
             <p:nvSpPr>
               <p:cNvPr id="3" name="내용 개체 틀 2"/>
@@ -8223,8 +8228,8 @@
           </a:fontRef>
         </p:style>
       </p:cxnSp>
-      <mc:AlternateContent xmlns:mc="http://schemas.openxmlformats.org/markup-compatibility/2006">
-        <mc:Choice xmlns:a14="http://schemas.microsoft.com/office/drawing/2010/main" Requires="a14">
+      <mc:AlternateContent xmlns:mc="http://schemas.openxmlformats.org/markup-compatibility/2006" xmlns:a14="http://schemas.microsoft.com/office/drawing/2010/main">
+        <mc:Choice Requires="a14">
           <p:sp>
             <p:nvSpPr>
               <p:cNvPr id="59" name="TextBox 58"/>
@@ -8247,6 +8252,7 @@
               </a:bodyPr>
               <a:lstStyle/>
               <a:p>
+                <a:pPr/>
                 <a14:m>
                   <m:oMathPara xmlns:m="http://schemas.openxmlformats.org/officeDocument/2006/math">
                     <m:oMathParaPr>
@@ -8321,7 +8327,7 @@
             </p:txBody>
           </p:sp>
         </mc:Choice>
-        <mc:Fallback>
+        <mc:Fallback xmlns="">
           <p:sp>
             <p:nvSpPr>
               <p:cNvPr id="59" name="TextBox 58"/>
@@ -8364,6 +8370,2844 @@
     <p:extLst>
       <p:ext uri="{BB962C8B-B14F-4D97-AF65-F5344CB8AC3E}">
         <p14:creationId xmlns:p14="http://schemas.microsoft.com/office/powerpoint/2010/main" val="2038950543"/>
+      </p:ext>
+    </p:extLst>
+  </p:cSld>
+  <p:clrMapOvr>
+    <a:masterClrMapping/>
+  </p:clrMapOvr>
+  <p:timing>
+    <p:tnLst>
+      <p:par>
+        <p:cTn id="1" dur="indefinite" restart="never" nodeType="tmRoot"/>
+      </p:par>
+    </p:tnLst>
+  </p:timing>
+</p:sld>
+</file>
+
+<file path=ppt/slides/slide4.xml><?xml version="1.0" encoding="utf-8"?>
+<p:sld xmlns:a="http://schemas.openxmlformats.org/drawingml/2006/main" xmlns:r="http://schemas.openxmlformats.org/officeDocument/2006/relationships" xmlns:p="http://schemas.openxmlformats.org/presentationml/2006/main">
+  <p:cSld>
+    <p:spTree>
+      <p:nvGrpSpPr>
+        <p:cNvPr id="1" name=""/>
+        <p:cNvGrpSpPr/>
+        <p:nvPr/>
+      </p:nvGrpSpPr>
+      <p:grpSpPr>
+        <a:xfrm>
+          <a:off x="0" y="0"/>
+          <a:ext cx="0" cy="0"/>
+          <a:chOff x="0" y="0"/>
+          <a:chExt cx="0" cy="0"/>
+        </a:xfrm>
+      </p:grpSpPr>
+      <p:sp>
+        <p:nvSpPr>
+          <p:cNvPr id="2" name="제목 1"/>
+          <p:cNvSpPr>
+            <a:spLocks noGrp="1"/>
+          </p:cNvSpPr>
+          <p:nvPr>
+            <p:ph type="title"/>
+          </p:nvPr>
+        </p:nvSpPr>
+        <p:spPr/>
+        <p:txBody>
+          <a:bodyPr>
+            <a:normAutofit/>
+          </a:bodyPr>
+          <a:lstStyle/>
+          <a:p>
+            <a:r>
+              <a:rPr lang="en-US" altLang="ko-KR" sz="3600" b="1" dirty="0" smtClean="0">
+                <a:latin typeface="+mn-ea"/>
+                <a:ea typeface="+mn-ea"/>
+              </a:rPr>
+              <a:t>02. </a:t>
+            </a:r>
+            <a:r>
+              <a:rPr lang="ko-KR" altLang="en-US" sz="3600" b="1" dirty="0" smtClean="0">
+                <a:latin typeface="+mn-ea"/>
+                <a:ea typeface="+mn-ea"/>
+              </a:rPr>
+              <a:t>지도 학습과 비지도 학습</a:t>
+            </a:r>
+            <a:endParaRPr lang="ko-KR" altLang="en-US" sz="3600" b="1" dirty="0">
+              <a:latin typeface="+mn-ea"/>
+              <a:ea typeface="+mn-ea"/>
+            </a:endParaRPr>
+          </a:p>
+        </p:txBody>
+      </p:sp>
+      <mc:AlternateContent xmlns:mc="http://schemas.openxmlformats.org/markup-compatibility/2006">
+        <mc:Choice xmlns:a14="http://schemas.microsoft.com/office/drawing/2010/main" Requires="a14">
+          <p:sp>
+            <p:nvSpPr>
+              <p:cNvPr id="4" name="내용 개체 틀 3"/>
+              <p:cNvSpPr>
+                <a:spLocks noGrp="1"/>
+              </p:cNvSpPr>
+              <p:nvPr>
+                <p:ph sz="quarter" idx="1"/>
+              </p:nvPr>
+            </p:nvSpPr>
+            <p:spPr>
+              <a:xfrm>
+                <a:off x="467544" y="1368490"/>
+                <a:ext cx="8229600" cy="4937760"/>
+              </a:xfrm>
+            </p:spPr>
+            <p:txBody>
+              <a:bodyPr>
+                <a:normAutofit/>
+              </a:bodyPr>
+              <a:lstStyle/>
+              <a:p>
+                <a:pPr>
+                  <a:lnSpc>
+                    <a:spcPct val="150000"/>
+                  </a:lnSpc>
+                </a:pPr>
+                <a:r>
+                  <a:rPr lang="ko-KR" altLang="en-US" sz="2000" b="1" dirty="0" smtClean="0"/>
+                  <a:t>지도 학습 </a:t>
+                </a:r>
+                <a:r>
+                  <a:rPr lang="en-US" altLang="ko-KR" sz="2000" b="1" dirty="0" smtClean="0"/>
+                  <a:t>(Supervised Learning)</a:t>
+                </a:r>
+              </a:p>
+              <a:p>
+                <a:pPr marL="0" indent="0">
+                  <a:lnSpc>
+                    <a:spcPct val="150000"/>
+                  </a:lnSpc>
+                  <a:buNone/>
+                </a:pPr>
+                <a:r>
+                  <a:rPr lang="en-US" altLang="ko-KR" sz="1600" dirty="0" smtClean="0">
+                    <a:latin typeface="+mn-ea"/>
+                  </a:rPr>
+                  <a:t>: </a:t>
+                </a:r>
+                <a14:m>
+                  <m:oMath xmlns:m="http://schemas.openxmlformats.org/officeDocument/2006/math">
+                    <m:r>
+                      <m:rPr>
+                        <m:sty m:val="p"/>
+                      </m:rPr>
+                      <a:rPr lang="en-US" altLang="ko-KR" sz="1600" b="0" i="0" smtClean="0">
+                        <a:latin typeface="Cambria Math"/>
+                      </a:rPr>
+                      <m:t>Y</m:t>
+                    </m:r>
+                    <m:r>
+                      <a:rPr lang="en-US" altLang="ko-KR" sz="1600" i="1">
+                        <a:latin typeface="Cambria Math"/>
+                      </a:rPr>
+                      <m:t>=</m:t>
+                    </m:r>
+                    <m:r>
+                      <a:rPr lang="en-US" altLang="ko-KR" sz="1600" b="0" i="1" smtClean="0">
+                        <a:latin typeface="Cambria Math"/>
+                      </a:rPr>
+                      <m:t>𝑓</m:t>
+                    </m:r>
+                    <m:d>
+                      <m:dPr>
+                        <m:ctrlPr>
+                          <a:rPr lang="en-US" altLang="ko-KR" sz="1600" b="0" i="1" smtClean="0">
+                            <a:latin typeface="Cambria Math"/>
+                          </a:rPr>
+                        </m:ctrlPr>
+                      </m:dPr>
+                      <m:e>
+                        <m:r>
+                          <a:rPr lang="en-US" altLang="ko-KR" sz="1600" i="1">
+                            <a:latin typeface="Cambria Math"/>
+                          </a:rPr>
+                          <m:t>𝑋</m:t>
+                        </m:r>
+                      </m:e>
+                    </m:d>
+                  </m:oMath>
+                </a14:m>
+                <a:r>
+                  <a:rPr lang="ko-KR" altLang="en-US" sz="1600" dirty="0" smtClean="0">
+                    <a:latin typeface="+mn-ea"/>
+                  </a:rPr>
+                  <a:t>에 대하여 입력변수</a:t>
+                </a:r>
+                <a:r>
+                  <a:rPr lang="en-US" altLang="ko-KR" sz="1600" dirty="0" smtClean="0">
+                    <a:latin typeface="+mn-ea"/>
+                  </a:rPr>
+                  <a:t>(X)</a:t>
+                </a:r>
+                <a:r>
+                  <a:rPr lang="ko-KR" altLang="en-US" sz="1600" dirty="0" smtClean="0">
+                    <a:latin typeface="+mn-ea"/>
+                  </a:rPr>
+                  <a:t>와 출력변수</a:t>
+                </a:r>
+                <a:r>
+                  <a:rPr lang="en-US" altLang="ko-KR" sz="1600" dirty="0" smtClean="0">
+                    <a:latin typeface="+mn-ea"/>
+                  </a:rPr>
+                  <a:t>(Y)</a:t>
+                </a:r>
+                <a:r>
+                  <a:rPr lang="ko-KR" altLang="en-US" sz="1600" dirty="0" smtClean="0">
+                    <a:latin typeface="+mn-ea"/>
+                  </a:rPr>
+                  <a:t>간 관계를 모델링 하는 것</a:t>
+                </a:r>
+                <a:endParaRPr lang="en-US" altLang="ko-KR" sz="1600" dirty="0" smtClean="0">
+                  <a:latin typeface="+mn-ea"/>
+                </a:endParaRPr>
+              </a:p>
+              <a:p>
+                <a:pPr marL="0" indent="0">
+                  <a:lnSpc>
+                    <a:spcPct val="150000"/>
+                  </a:lnSpc>
+                  <a:buNone/>
+                </a:pPr>
+                <a:r>
+                  <a:rPr lang="ko-KR" altLang="en-US" sz="1600" dirty="0" smtClean="0">
+                    <a:latin typeface="+mn-ea"/>
+                  </a:rPr>
+                  <a:t>  ☞ 즉</a:t>
+                </a:r>
+                <a:r>
+                  <a:rPr lang="en-US" altLang="ko-KR" sz="1600" dirty="0" smtClean="0">
+                    <a:latin typeface="+mn-ea"/>
+                  </a:rPr>
+                  <a:t>,  </a:t>
+                </a:r>
+                <a:r>
+                  <a:rPr lang="ko-KR" altLang="en-US" sz="1600" b="1" u="sng" dirty="0" smtClean="0">
+                    <a:latin typeface="+mn-ea"/>
+                  </a:rPr>
+                  <a:t>과거의 데이터</a:t>
+                </a:r>
+                <a:r>
+                  <a:rPr lang="ko-KR" altLang="en-US" sz="1600" dirty="0" smtClean="0">
+                    <a:latin typeface="+mn-ea"/>
+                  </a:rPr>
+                  <a:t>를 통해 </a:t>
+                </a:r>
+                <a:r>
+                  <a:rPr lang="ko-KR" altLang="en-US" sz="1600" b="1" dirty="0" smtClean="0">
+                    <a:solidFill>
+                      <a:srgbClr val="C00000"/>
+                    </a:solidFill>
+                    <a:latin typeface="+mn-ea"/>
+                  </a:rPr>
+                  <a:t>미래를 예측</a:t>
+                </a:r>
+                <a:r>
+                  <a:rPr lang="ko-KR" altLang="en-US" sz="1600" dirty="0" smtClean="0">
+                    <a:latin typeface="+mn-ea"/>
+                  </a:rPr>
+                  <a:t>하고자 함</a:t>
+                </a:r>
+                <a:r>
+                  <a:rPr lang="en-US" altLang="ko-KR" sz="1600" dirty="0" smtClean="0">
+                    <a:latin typeface="+mn-ea"/>
+                  </a:rPr>
+                  <a:t>.</a:t>
+                </a:r>
+              </a:p>
+              <a:p>
+                <a:pPr marL="0" indent="0">
+                  <a:buNone/>
+                </a:pPr>
+                <a:endParaRPr lang="ko-KR" altLang="en-US" sz="2000" dirty="0">
+                  <a:latin typeface="+mn-ea"/>
+                </a:endParaRPr>
+              </a:p>
+            </p:txBody>
+          </p:sp>
+        </mc:Choice>
+        <mc:Fallback>
+          <p:sp>
+            <p:nvSpPr>
+              <p:cNvPr id="4" name="내용 개체 틀 3"/>
+              <p:cNvSpPr>
+                <a:spLocks noGrp="1" noRot="1" noChangeAspect="1" noMove="1" noResize="1" noEditPoints="1" noAdjustHandles="1" noChangeArrowheads="1" noChangeShapeType="1" noTextEdit="1"/>
+              </p:cNvSpPr>
+              <p:nvPr>
+                <p:ph sz="quarter" idx="1"/>
+              </p:nvPr>
+            </p:nvSpPr>
+            <p:spPr>
+              <a:xfrm>
+                <a:off x="467544" y="1368490"/>
+                <a:ext cx="8229600" cy="4937760"/>
+              </a:xfrm>
+              <a:blipFill rotWithShape="1">
+                <a:blip r:embed="rId2"/>
+                <a:stretch>
+                  <a:fillRect l="-444"/>
+                </a:stretch>
+              </a:blipFill>
+            </p:spPr>
+            <p:txBody>
+              <a:bodyPr/>
+              <a:lstStyle/>
+              <a:p>
+                <a:r>
+                  <a:rPr lang="ko-KR" altLang="en-US">
+                    <a:noFill/>
+                  </a:rPr>
+                  <a:t> </a:t>
+                </a:r>
+              </a:p>
+            </p:txBody>
+          </p:sp>
+        </mc:Fallback>
+      </mc:AlternateContent>
+      <p:pic>
+        <p:nvPicPr>
+          <p:cNvPr id="1026" name="Picture 2"/>
+          <p:cNvPicPr>
+            <a:picLocks noChangeAspect="1" noChangeArrowheads="1"/>
+          </p:cNvPicPr>
+          <p:nvPr/>
+        </p:nvPicPr>
+        <p:blipFill>
+          <a:blip r:embed="rId3">
+            <a:extLst>
+              <a:ext uri="{28A0092B-C50C-407E-A947-70E740481C1C}">
+                <a14:useLocalDpi xmlns:a14="http://schemas.microsoft.com/office/drawing/2010/main" val="0"/>
+              </a:ext>
+            </a:extLst>
+          </a:blip>
+          <a:srcRect/>
+          <a:stretch>
+            <a:fillRect/>
+          </a:stretch>
+        </p:blipFill>
+        <p:spPr bwMode="auto">
+          <a:xfrm>
+            <a:off x="1064295" y="4320839"/>
+            <a:ext cx="2787623" cy="1851125"/>
+          </a:xfrm>
+          <a:prstGeom prst="rect">
+            <a:avLst/>
+          </a:prstGeom>
+          <a:noFill/>
+          <a:ln>
+            <a:noFill/>
+          </a:ln>
+          <a:extLst>
+            <a:ext uri="{909E8E84-426E-40DD-AFC4-6F175D3DCCD1}">
+              <a14:hiddenFill xmlns:a14="http://schemas.microsoft.com/office/drawing/2010/main">
+                <a:solidFill>
+                  <a:schemeClr val="accent1"/>
+                </a:solidFill>
+              </a14:hiddenFill>
+            </a:ext>
+            <a:ext uri="{91240B29-F687-4F45-9708-019B960494DF}">
+              <a14:hiddenLine xmlns:a14="http://schemas.microsoft.com/office/drawing/2010/main" w="9525">
+                <a:solidFill>
+                  <a:schemeClr val="tx1"/>
+                </a:solidFill>
+                <a:miter lim="800000"/>
+                <a:headEnd/>
+                <a:tailEnd/>
+              </a14:hiddenLine>
+            </a:ext>
+          </a:extLst>
+        </p:spPr>
+      </p:pic>
+      <p:pic>
+        <p:nvPicPr>
+          <p:cNvPr id="1027" name="Picture 3"/>
+          <p:cNvPicPr>
+            <a:picLocks noChangeAspect="1" noChangeArrowheads="1"/>
+          </p:cNvPicPr>
+          <p:nvPr/>
+        </p:nvPicPr>
+        <p:blipFill>
+          <a:blip r:embed="rId4">
+            <a:extLst>
+              <a:ext uri="{28A0092B-C50C-407E-A947-70E740481C1C}">
+                <a14:useLocalDpi xmlns:a14="http://schemas.microsoft.com/office/drawing/2010/main" val="0"/>
+              </a:ext>
+            </a:extLst>
+          </a:blip>
+          <a:srcRect/>
+          <a:stretch>
+            <a:fillRect/>
+          </a:stretch>
+        </p:blipFill>
+        <p:spPr bwMode="auto">
+          <a:xfrm>
+            <a:off x="4419059" y="4417504"/>
+            <a:ext cx="2673221" cy="1737219"/>
+          </a:xfrm>
+          <a:prstGeom prst="rect">
+            <a:avLst/>
+          </a:prstGeom>
+          <a:noFill/>
+          <a:ln>
+            <a:noFill/>
+          </a:ln>
+          <a:extLst>
+            <a:ext uri="{909E8E84-426E-40DD-AFC4-6F175D3DCCD1}">
+              <a14:hiddenFill xmlns:a14="http://schemas.microsoft.com/office/drawing/2010/main">
+                <a:solidFill>
+                  <a:schemeClr val="accent1"/>
+                </a:solidFill>
+              </a14:hiddenFill>
+            </a:ext>
+            <a:ext uri="{91240B29-F687-4F45-9708-019B960494DF}">
+              <a14:hiddenLine xmlns:a14="http://schemas.microsoft.com/office/drawing/2010/main" w="9525">
+                <a:solidFill>
+                  <a:schemeClr val="tx1"/>
+                </a:solidFill>
+                <a:miter lim="800000"/>
+                <a:headEnd/>
+                <a:tailEnd/>
+              </a14:hiddenLine>
+            </a:ext>
+          </a:extLst>
+        </p:spPr>
+      </p:pic>
+      <p:sp>
+        <p:nvSpPr>
+          <p:cNvPr id="5" name="직사각형 4"/>
+          <p:cNvSpPr/>
+          <p:nvPr/>
+        </p:nvSpPr>
+        <p:spPr>
+          <a:xfrm>
+            <a:off x="1064296" y="3844572"/>
+            <a:ext cx="2787623" cy="457403"/>
+          </a:xfrm>
+          <a:prstGeom prst="rect">
+            <a:avLst/>
+          </a:prstGeom>
+          <a:solidFill>
+            <a:schemeClr val="accent1"/>
+          </a:solidFill>
+          <a:ln>
+            <a:noFill/>
+          </a:ln>
+          <a:effectLst>
+            <a:outerShdw blurRad="44450" dist="27940" dir="5400000" algn="ctr">
+              <a:srgbClr val="000000">
+                <a:alpha val="32000"/>
+              </a:srgbClr>
+            </a:outerShdw>
+          </a:effectLst>
+          <a:scene3d>
+            <a:camera prst="orthographicFront">
+              <a:rot lat="0" lon="0" rev="0"/>
+            </a:camera>
+            <a:lightRig rig="balanced" dir="t">
+              <a:rot lat="0" lon="0" rev="8700000"/>
+            </a:lightRig>
+          </a:scene3d>
+          <a:sp3d>
+            <a:bevelT w="190500" h="38100"/>
+          </a:sp3d>
+        </p:spPr>
+        <p:style>
+          <a:lnRef idx="2">
+            <a:schemeClr val="accent1">
+              <a:shade val="50000"/>
+            </a:schemeClr>
+          </a:lnRef>
+          <a:fillRef idx="1">
+            <a:schemeClr val="accent1"/>
+          </a:fillRef>
+          <a:effectRef idx="0">
+            <a:schemeClr val="accent1"/>
+          </a:effectRef>
+          <a:fontRef idx="minor">
+            <a:schemeClr val="lt1"/>
+          </a:fontRef>
+        </p:style>
+        <p:txBody>
+          <a:bodyPr rtlCol="0" anchor="ctr"/>
+          <a:lstStyle/>
+          <a:p>
+            <a:pPr algn="ctr"/>
+            <a:r>
+              <a:rPr lang="ko-KR" altLang="en-US" dirty="0" smtClean="0"/>
+              <a:t>예측</a:t>
+            </a:r>
+            <a:endParaRPr lang="ko-KR" altLang="en-US" dirty="0"/>
+          </a:p>
+        </p:txBody>
+      </p:sp>
+      <p:sp>
+        <p:nvSpPr>
+          <p:cNvPr id="54" name="직사각형 53"/>
+          <p:cNvSpPr/>
+          <p:nvPr/>
+        </p:nvSpPr>
+        <p:spPr>
+          <a:xfrm>
+            <a:off x="4302832" y="3844571"/>
+            <a:ext cx="2787622" cy="457403"/>
+          </a:xfrm>
+          <a:prstGeom prst="rect">
+            <a:avLst/>
+          </a:prstGeom>
+          <a:solidFill>
+            <a:schemeClr val="accent1"/>
+          </a:solidFill>
+          <a:ln>
+            <a:noFill/>
+          </a:ln>
+          <a:effectLst>
+            <a:outerShdw blurRad="44450" dist="27940" dir="5400000" algn="ctr">
+              <a:srgbClr val="000000">
+                <a:alpha val="32000"/>
+              </a:srgbClr>
+            </a:outerShdw>
+          </a:effectLst>
+          <a:scene3d>
+            <a:camera prst="orthographicFront">
+              <a:rot lat="0" lon="0" rev="0"/>
+            </a:camera>
+            <a:lightRig rig="balanced" dir="t">
+              <a:rot lat="0" lon="0" rev="8700000"/>
+            </a:lightRig>
+          </a:scene3d>
+          <a:sp3d>
+            <a:bevelT w="190500" h="38100"/>
+          </a:sp3d>
+        </p:spPr>
+        <p:style>
+          <a:lnRef idx="2">
+            <a:schemeClr val="accent1">
+              <a:shade val="50000"/>
+            </a:schemeClr>
+          </a:lnRef>
+          <a:fillRef idx="1">
+            <a:schemeClr val="accent1"/>
+          </a:fillRef>
+          <a:effectRef idx="0">
+            <a:schemeClr val="accent1"/>
+          </a:effectRef>
+          <a:fontRef idx="minor">
+            <a:schemeClr val="lt1"/>
+          </a:fontRef>
+        </p:style>
+        <p:txBody>
+          <a:bodyPr rtlCol="0" anchor="ctr"/>
+          <a:lstStyle/>
+          <a:p>
+            <a:pPr algn="ctr"/>
+            <a:r>
+              <a:rPr lang="ko-KR" altLang="en-US" dirty="0" smtClean="0"/>
+              <a:t>분류</a:t>
+            </a:r>
+            <a:endParaRPr lang="ko-KR" altLang="en-US" dirty="0"/>
+          </a:p>
+        </p:txBody>
+      </p:sp>
+      <p:sp>
+        <p:nvSpPr>
+          <p:cNvPr id="56" name="직사각형 55"/>
+          <p:cNvSpPr/>
+          <p:nvPr/>
+        </p:nvSpPr>
+        <p:spPr>
+          <a:xfrm>
+            <a:off x="1043608" y="3140968"/>
+            <a:ext cx="6048672" cy="457403"/>
+          </a:xfrm>
+          <a:prstGeom prst="rect">
+            <a:avLst/>
+          </a:prstGeom>
+          <a:solidFill>
+            <a:schemeClr val="accent5">
+              <a:lumMod val="75000"/>
+            </a:schemeClr>
+          </a:solidFill>
+          <a:ln>
+            <a:noFill/>
+          </a:ln>
+          <a:effectLst>
+            <a:outerShdw blurRad="44450" dist="27940" dir="5400000" algn="ctr">
+              <a:srgbClr val="000000">
+                <a:alpha val="32000"/>
+              </a:srgbClr>
+            </a:outerShdw>
+          </a:effectLst>
+          <a:scene3d>
+            <a:camera prst="orthographicFront">
+              <a:rot lat="0" lon="0" rev="0"/>
+            </a:camera>
+            <a:lightRig rig="balanced" dir="t">
+              <a:rot lat="0" lon="0" rev="8700000"/>
+            </a:lightRig>
+          </a:scene3d>
+          <a:sp3d>
+            <a:bevelT w="190500" h="38100"/>
+          </a:sp3d>
+        </p:spPr>
+        <p:style>
+          <a:lnRef idx="2">
+            <a:schemeClr val="accent1">
+              <a:shade val="50000"/>
+            </a:schemeClr>
+          </a:lnRef>
+          <a:fillRef idx="1">
+            <a:schemeClr val="accent1"/>
+          </a:fillRef>
+          <a:effectRef idx="0">
+            <a:schemeClr val="accent1"/>
+          </a:effectRef>
+          <a:fontRef idx="minor">
+            <a:schemeClr val="lt1"/>
+          </a:fontRef>
+        </p:style>
+        <p:txBody>
+          <a:bodyPr rtlCol="0" anchor="ctr"/>
+          <a:lstStyle/>
+          <a:p>
+            <a:pPr algn="ctr"/>
+            <a:r>
+              <a:rPr lang="ko-KR" altLang="en-US" dirty="0" smtClean="0"/>
+              <a:t>지도 학습</a:t>
+            </a:r>
+            <a:endParaRPr lang="ko-KR" altLang="en-US" dirty="0"/>
+          </a:p>
+        </p:txBody>
+      </p:sp>
+    </p:spTree>
+    <p:extLst>
+      <p:ext uri="{BB962C8B-B14F-4D97-AF65-F5344CB8AC3E}">
+        <p14:creationId xmlns:p14="http://schemas.microsoft.com/office/powerpoint/2010/main" val="332719529"/>
+      </p:ext>
+    </p:extLst>
+  </p:cSld>
+  <p:clrMapOvr>
+    <a:masterClrMapping/>
+  </p:clrMapOvr>
+  <p:timing>
+    <p:tnLst>
+      <p:par>
+        <p:cTn id="1" dur="indefinite" restart="never" nodeType="tmRoot"/>
+      </p:par>
+    </p:tnLst>
+  </p:timing>
+</p:sld>
+</file>
+
+<file path=ppt/slides/slide5.xml><?xml version="1.0" encoding="utf-8"?>
+<p:sld xmlns:a="http://schemas.openxmlformats.org/drawingml/2006/main" xmlns:r="http://schemas.openxmlformats.org/officeDocument/2006/relationships" xmlns:p="http://schemas.openxmlformats.org/presentationml/2006/main">
+  <p:cSld>
+    <p:spTree>
+      <p:nvGrpSpPr>
+        <p:cNvPr id="1" name=""/>
+        <p:cNvGrpSpPr/>
+        <p:nvPr/>
+      </p:nvGrpSpPr>
+      <p:grpSpPr>
+        <a:xfrm>
+          <a:off x="0" y="0"/>
+          <a:ext cx="0" cy="0"/>
+          <a:chOff x="0" y="0"/>
+          <a:chExt cx="0" cy="0"/>
+        </a:xfrm>
+      </p:grpSpPr>
+      <p:sp>
+        <p:nvSpPr>
+          <p:cNvPr id="2" name="제목 1"/>
+          <p:cNvSpPr>
+            <a:spLocks noGrp="1"/>
+          </p:cNvSpPr>
+          <p:nvPr>
+            <p:ph type="title"/>
+          </p:nvPr>
+        </p:nvSpPr>
+        <p:spPr/>
+        <p:txBody>
+          <a:bodyPr>
+            <a:normAutofit/>
+          </a:bodyPr>
+          <a:lstStyle/>
+          <a:p>
+            <a:r>
+              <a:rPr lang="en-US" altLang="ko-KR" sz="3600" b="1" dirty="0" smtClean="0">
+                <a:latin typeface="+mn-ea"/>
+                <a:ea typeface="+mn-ea"/>
+              </a:rPr>
+              <a:t>02. </a:t>
+            </a:r>
+            <a:r>
+              <a:rPr lang="ko-KR" altLang="en-US" sz="3600" b="1" dirty="0" smtClean="0">
+                <a:latin typeface="+mn-ea"/>
+                <a:ea typeface="+mn-ea"/>
+              </a:rPr>
+              <a:t>지도 학습과 비지도 학습</a:t>
+            </a:r>
+            <a:endParaRPr lang="ko-KR" altLang="en-US" sz="3600" b="1" dirty="0">
+              <a:latin typeface="+mn-ea"/>
+              <a:ea typeface="+mn-ea"/>
+            </a:endParaRPr>
+          </a:p>
+        </p:txBody>
+      </p:sp>
+      <mc:AlternateContent xmlns:mc="http://schemas.openxmlformats.org/markup-compatibility/2006">
+        <mc:Choice xmlns:a14="http://schemas.microsoft.com/office/drawing/2010/main" Requires="a14">
+          <p:sp>
+            <p:nvSpPr>
+              <p:cNvPr id="4" name="내용 개체 틀 3"/>
+              <p:cNvSpPr>
+                <a:spLocks noGrp="1"/>
+              </p:cNvSpPr>
+              <p:nvPr>
+                <p:ph sz="quarter" idx="1"/>
+              </p:nvPr>
+            </p:nvSpPr>
+            <p:spPr>
+              <a:xfrm>
+                <a:off x="467544" y="1368490"/>
+                <a:ext cx="8229600" cy="4937760"/>
+              </a:xfrm>
+            </p:spPr>
+            <p:txBody>
+              <a:bodyPr>
+                <a:normAutofit/>
+              </a:bodyPr>
+              <a:lstStyle/>
+              <a:p>
+                <a:pPr>
+                  <a:lnSpc>
+                    <a:spcPct val="150000"/>
+                  </a:lnSpc>
+                </a:pPr>
+                <a:r>
+                  <a:rPr lang="ko-KR" altLang="en-US" sz="2000" b="1" dirty="0" smtClean="0"/>
+                  <a:t>비지도 학습 </a:t>
+                </a:r>
+                <a:r>
+                  <a:rPr lang="en-US" altLang="ko-KR" sz="2000" b="1" dirty="0" smtClean="0"/>
+                  <a:t>(Unsupervised Learning)</a:t>
+                </a:r>
+              </a:p>
+              <a:p>
+                <a:pPr marL="0" indent="0">
+                  <a:lnSpc>
+                    <a:spcPct val="150000"/>
+                  </a:lnSpc>
+                  <a:buNone/>
+                </a:pPr>
+                <a:r>
+                  <a:rPr lang="en-US" altLang="ko-KR" sz="1600" dirty="0" smtClean="0">
+                    <a:latin typeface="+mn-ea"/>
+                  </a:rPr>
+                  <a:t>: </a:t>
+                </a:r>
+                <a:r>
+                  <a:rPr lang="ko-KR" altLang="en-US" sz="1600" dirty="0" smtClean="0">
+                    <a:latin typeface="+mn-ea"/>
+                  </a:rPr>
+                  <a:t>출력변수 </a:t>
+                </a:r>
+                <a14:m>
+                  <m:oMath xmlns:m="http://schemas.openxmlformats.org/officeDocument/2006/math">
+                    <m:r>
+                      <m:rPr>
+                        <m:sty m:val="p"/>
+                      </m:rPr>
+                      <a:rPr lang="en-US" altLang="ko-KR" sz="1600" b="0" i="0" smtClean="0">
+                        <a:latin typeface="Cambria Math"/>
+                      </a:rPr>
+                      <m:t>Y</m:t>
+                    </m:r>
+                  </m:oMath>
+                </a14:m>
+                <a:r>
+                  <a:rPr lang="ko-KR" altLang="en-US" sz="1600" dirty="0" smtClean="0">
+                    <a:latin typeface="+mn-ea"/>
+                  </a:rPr>
+                  <a:t>가 없고</a:t>
+                </a:r>
+                <a:r>
+                  <a:rPr lang="en-US" altLang="ko-KR" sz="1600" dirty="0" smtClean="0">
+                    <a:latin typeface="+mn-ea"/>
+                  </a:rPr>
+                  <a:t>, </a:t>
+                </a:r>
+                <a:r>
+                  <a:rPr lang="ko-KR" altLang="en-US" sz="1600" dirty="0" smtClean="0">
+                    <a:latin typeface="+mn-ea"/>
+                  </a:rPr>
+                  <a:t>입력변수</a:t>
+                </a:r>
+                <a:r>
+                  <a:rPr lang="en-US" altLang="ko-KR" sz="1600" dirty="0" smtClean="0">
+                    <a:latin typeface="+mn-ea"/>
+                  </a:rPr>
+                  <a:t>(X)</a:t>
+                </a:r>
+                <a:r>
+                  <a:rPr lang="ko-KR" altLang="en-US" sz="1600" dirty="0" smtClean="0">
+                    <a:latin typeface="+mn-ea"/>
+                  </a:rPr>
+                  <a:t>간 관계를 모델링 하는 것</a:t>
+                </a:r>
+                <a:endParaRPr lang="en-US" altLang="ko-KR" sz="1600" dirty="0" smtClean="0">
+                  <a:latin typeface="+mn-ea"/>
+                </a:endParaRPr>
+              </a:p>
+              <a:p>
+                <a:pPr marL="0" indent="0">
+                  <a:lnSpc>
+                    <a:spcPct val="150000"/>
+                  </a:lnSpc>
+                  <a:buNone/>
+                </a:pPr>
+                <a:r>
+                  <a:rPr lang="ko-KR" altLang="en-US" sz="1600" dirty="0" smtClean="0">
+                    <a:latin typeface="+mn-ea"/>
+                  </a:rPr>
+                  <a:t>  ☞ 즉</a:t>
+                </a:r>
+                <a:r>
+                  <a:rPr lang="en-US" altLang="ko-KR" sz="1600" dirty="0" smtClean="0">
+                    <a:latin typeface="+mn-ea"/>
+                  </a:rPr>
+                  <a:t>, </a:t>
+                </a:r>
+                <a:r>
+                  <a:rPr lang="ko-KR" altLang="en-US" sz="1600" dirty="0" smtClean="0">
+                    <a:latin typeface="+mn-ea"/>
+                  </a:rPr>
+                  <a:t>존재하는 </a:t>
+                </a:r>
+                <a:r>
+                  <a:rPr lang="ko-KR" altLang="en-US" sz="1600" b="1" u="sng" dirty="0" smtClean="0">
+                    <a:latin typeface="+mn-ea"/>
+                  </a:rPr>
+                  <a:t>데</a:t>
+                </a:r>
+                <a:r>
+                  <a:rPr lang="en-US" altLang="ko-KR" sz="1600" b="1" u="sng" dirty="0" smtClean="0">
+                    <a:latin typeface="+mn-ea"/>
+                  </a:rPr>
+                  <a:t>	</a:t>
+                </a:r>
+                <a:r>
+                  <a:rPr lang="ko-KR" altLang="en-US" sz="1600" b="1" u="sng" dirty="0" err="1" smtClean="0">
+                    <a:latin typeface="+mn-ea"/>
+                  </a:rPr>
+                  <a:t>이터</a:t>
+                </a:r>
+                <a:r>
+                  <a:rPr lang="ko-KR" altLang="en-US" sz="1600" b="1" u="sng" dirty="0" smtClean="0">
+                    <a:latin typeface="+mn-ea"/>
+                  </a:rPr>
+                  <a:t> 간 관계</a:t>
+                </a:r>
+                <a:r>
+                  <a:rPr lang="ko-KR" altLang="en-US" sz="1600" dirty="0" smtClean="0">
+                    <a:latin typeface="+mn-ea"/>
+                  </a:rPr>
+                  <a:t>를 통해 </a:t>
+                </a:r>
+                <a:r>
+                  <a:rPr lang="ko-KR" altLang="en-US" sz="1600" b="1" dirty="0" smtClean="0">
+                    <a:solidFill>
+                      <a:srgbClr val="C00000"/>
+                    </a:solidFill>
+                    <a:latin typeface="+mn-ea"/>
+                  </a:rPr>
+                  <a:t>새로운 의미나 패턴</a:t>
+                </a:r>
+                <a:r>
+                  <a:rPr lang="ko-KR" altLang="en-US" sz="1600" dirty="0" smtClean="0">
+                    <a:latin typeface="+mn-ea"/>
+                  </a:rPr>
+                  <a:t>을 밝혀내고자 함</a:t>
+                </a:r>
+                <a:r>
+                  <a:rPr lang="en-US" altLang="ko-KR" sz="1600" dirty="0" smtClean="0">
+                    <a:latin typeface="+mn-ea"/>
+                  </a:rPr>
+                  <a:t>.</a:t>
+                </a:r>
+              </a:p>
+              <a:p>
+                <a:pPr marL="0" indent="0">
+                  <a:buNone/>
+                </a:pPr>
+                <a:endParaRPr lang="ko-KR" altLang="en-US" sz="2000" dirty="0">
+                  <a:latin typeface="+mn-ea"/>
+                </a:endParaRPr>
+              </a:p>
+            </p:txBody>
+          </p:sp>
+        </mc:Choice>
+        <mc:Fallback>
+          <p:sp>
+            <p:nvSpPr>
+              <p:cNvPr id="4" name="내용 개체 틀 3"/>
+              <p:cNvSpPr>
+                <a:spLocks noGrp="1" noRot="1" noChangeAspect="1" noMove="1" noResize="1" noEditPoints="1" noAdjustHandles="1" noChangeArrowheads="1" noChangeShapeType="1" noTextEdit="1"/>
+              </p:cNvSpPr>
+              <p:nvPr>
+                <p:ph sz="quarter" idx="1"/>
+              </p:nvPr>
+            </p:nvSpPr>
+            <p:spPr>
+              <a:xfrm>
+                <a:off x="467544" y="1368490"/>
+                <a:ext cx="8229600" cy="4937760"/>
+              </a:xfrm>
+              <a:blipFill rotWithShape="1">
+                <a:blip r:embed="rId2"/>
+                <a:stretch>
+                  <a:fillRect l="-444"/>
+                </a:stretch>
+              </a:blipFill>
+            </p:spPr>
+            <p:txBody>
+              <a:bodyPr/>
+              <a:lstStyle/>
+              <a:p>
+                <a:r>
+                  <a:rPr lang="ko-KR" altLang="en-US">
+                    <a:noFill/>
+                  </a:rPr>
+                  <a:t> </a:t>
+                </a:r>
+              </a:p>
+            </p:txBody>
+          </p:sp>
+        </mc:Fallback>
+      </mc:AlternateContent>
+      <p:sp>
+        <p:nvSpPr>
+          <p:cNvPr id="5" name="직사각형 4"/>
+          <p:cNvSpPr/>
+          <p:nvPr/>
+        </p:nvSpPr>
+        <p:spPr>
+          <a:xfrm>
+            <a:off x="575250" y="3284984"/>
+            <a:ext cx="1393811" cy="1124439"/>
+          </a:xfrm>
+          <a:prstGeom prst="rect">
+            <a:avLst/>
+          </a:prstGeom>
+          <a:solidFill>
+            <a:schemeClr val="accent1"/>
+          </a:solidFill>
+          <a:ln>
+            <a:noFill/>
+          </a:ln>
+          <a:effectLst>
+            <a:outerShdw blurRad="44450" dist="27940" dir="5400000" algn="ctr">
+              <a:srgbClr val="000000">
+                <a:alpha val="32000"/>
+              </a:srgbClr>
+            </a:outerShdw>
+          </a:effectLst>
+          <a:scene3d>
+            <a:camera prst="orthographicFront">
+              <a:rot lat="0" lon="0" rev="0"/>
+            </a:camera>
+            <a:lightRig rig="balanced" dir="t">
+              <a:rot lat="0" lon="0" rev="8700000"/>
+            </a:lightRig>
+          </a:scene3d>
+          <a:sp3d>
+            <a:bevelT w="190500" h="38100"/>
+          </a:sp3d>
+        </p:spPr>
+        <p:style>
+          <a:lnRef idx="2">
+            <a:schemeClr val="accent1">
+              <a:shade val="50000"/>
+            </a:schemeClr>
+          </a:lnRef>
+          <a:fillRef idx="1">
+            <a:schemeClr val="accent1"/>
+          </a:fillRef>
+          <a:effectRef idx="0">
+            <a:schemeClr val="accent1"/>
+          </a:effectRef>
+          <a:fontRef idx="minor">
+            <a:schemeClr val="lt1"/>
+          </a:fontRef>
+        </p:style>
+        <p:txBody>
+          <a:bodyPr rtlCol="0" anchor="ctr"/>
+          <a:lstStyle/>
+          <a:p>
+            <a:pPr algn="ctr"/>
+            <a:r>
+              <a:rPr lang="ko-KR" altLang="en-US" dirty="0" smtClean="0"/>
+              <a:t>군집화</a:t>
+            </a:r>
+            <a:endParaRPr lang="ko-KR" altLang="en-US" dirty="0"/>
+          </a:p>
+        </p:txBody>
+      </p:sp>
+      <p:sp>
+        <p:nvSpPr>
+          <p:cNvPr id="54" name="직사각형 53"/>
+          <p:cNvSpPr/>
+          <p:nvPr/>
+        </p:nvSpPr>
+        <p:spPr>
+          <a:xfrm>
+            <a:off x="575250" y="4941168"/>
+            <a:ext cx="1393811" cy="1124439"/>
+          </a:xfrm>
+          <a:prstGeom prst="rect">
+            <a:avLst/>
+          </a:prstGeom>
+          <a:solidFill>
+            <a:schemeClr val="accent1"/>
+          </a:solidFill>
+          <a:ln>
+            <a:noFill/>
+          </a:ln>
+          <a:effectLst>
+            <a:outerShdw blurRad="44450" dist="27940" dir="5400000" algn="ctr">
+              <a:srgbClr val="000000">
+                <a:alpha val="32000"/>
+              </a:srgbClr>
+            </a:outerShdw>
+          </a:effectLst>
+          <a:scene3d>
+            <a:camera prst="orthographicFront">
+              <a:rot lat="0" lon="0" rev="0"/>
+            </a:camera>
+            <a:lightRig rig="balanced" dir="t">
+              <a:rot lat="0" lon="0" rev="8700000"/>
+            </a:lightRig>
+          </a:scene3d>
+          <a:sp3d>
+            <a:bevelT w="190500" h="38100"/>
+          </a:sp3d>
+        </p:spPr>
+        <p:style>
+          <a:lnRef idx="2">
+            <a:schemeClr val="accent1">
+              <a:shade val="50000"/>
+            </a:schemeClr>
+          </a:lnRef>
+          <a:fillRef idx="1">
+            <a:schemeClr val="accent1"/>
+          </a:fillRef>
+          <a:effectRef idx="0">
+            <a:schemeClr val="accent1"/>
+          </a:effectRef>
+          <a:fontRef idx="minor">
+            <a:schemeClr val="lt1"/>
+          </a:fontRef>
+        </p:style>
+        <p:txBody>
+          <a:bodyPr rtlCol="0" anchor="ctr"/>
+          <a:lstStyle/>
+          <a:p>
+            <a:pPr algn="ctr"/>
+            <a:r>
+              <a:rPr lang="en-US" altLang="ko-KR" dirty="0" smtClean="0"/>
+              <a:t>PCA</a:t>
+            </a:r>
+          </a:p>
+          <a:p>
+            <a:pPr algn="ctr"/>
+            <a:r>
+              <a:rPr lang="en-US" altLang="ko-KR" sz="1400" dirty="0" smtClean="0"/>
+              <a:t>(</a:t>
+            </a:r>
+            <a:r>
+              <a:rPr lang="ko-KR" altLang="en-US" sz="1400" dirty="0" smtClean="0"/>
+              <a:t>주성분분석</a:t>
+            </a:r>
+            <a:r>
+              <a:rPr lang="en-US" altLang="ko-KR" sz="1400" dirty="0" smtClean="0"/>
+              <a:t>)</a:t>
+            </a:r>
+            <a:endParaRPr lang="ko-KR" altLang="en-US" dirty="0"/>
+          </a:p>
+        </p:txBody>
+      </p:sp>
+      <p:sp>
+        <p:nvSpPr>
+          <p:cNvPr id="3" name="TextBox 2"/>
+          <p:cNvSpPr txBox="1"/>
+          <p:nvPr/>
+        </p:nvSpPr>
+        <p:spPr>
+          <a:xfrm>
+            <a:off x="2195736" y="3284984"/>
+            <a:ext cx="4729180" cy="1169551"/>
+          </a:xfrm>
+          <a:prstGeom prst="rect">
+            <a:avLst/>
+          </a:prstGeom>
+          <a:noFill/>
+        </p:spPr>
+        <p:txBody>
+          <a:bodyPr wrap="none" rtlCol="0">
+            <a:spAutoFit/>
+          </a:bodyPr>
+          <a:lstStyle/>
+          <a:p>
+            <a:r>
+              <a:rPr lang="ko-KR" altLang="en-US" sz="1400" dirty="0" smtClean="0">
+                <a:latin typeface="+mn-ea"/>
+              </a:rPr>
+              <a:t>유사한 데이터 간 그룹화</a:t>
+            </a:r>
+            <a:r>
+              <a:rPr lang="en-US" altLang="ko-KR" sz="1400" dirty="0" smtClean="0">
+                <a:latin typeface="+mn-ea"/>
+              </a:rPr>
+              <a:t>(</a:t>
+            </a:r>
+            <a:r>
+              <a:rPr lang="en-US" altLang="ko-KR" sz="1400" dirty="0" err="1" smtClean="0">
+                <a:latin typeface="+mn-ea"/>
+              </a:rPr>
+              <a:t>Groupping</a:t>
+            </a:r>
+            <a:r>
+              <a:rPr lang="en-US" altLang="ko-KR" sz="1400" dirty="0" smtClean="0">
+                <a:latin typeface="+mn-ea"/>
+              </a:rPr>
+              <a:t>)</a:t>
+            </a:r>
+          </a:p>
+          <a:p>
+            <a:endParaRPr lang="en-US" altLang="ko-KR" sz="1400" dirty="0">
+              <a:latin typeface="+mn-ea"/>
+            </a:endParaRPr>
+          </a:p>
+          <a:p>
+            <a:r>
+              <a:rPr lang="en-US" altLang="ko-KR" sz="1400" dirty="0" smtClean="0">
+                <a:latin typeface="+mn-ea"/>
+              </a:rPr>
+              <a:t> </a:t>
+            </a:r>
+            <a:r>
+              <a:rPr lang="ko-KR" altLang="en-US" sz="1400" b="1" dirty="0" smtClean="0">
+                <a:solidFill>
+                  <a:srgbClr val="C00000"/>
+                </a:solidFill>
+                <a:latin typeface="+mn-ea"/>
+              </a:rPr>
+              <a:t>☞ 분류와 차이점</a:t>
+            </a:r>
+            <a:endParaRPr lang="en-US" altLang="ko-KR" sz="1400" b="1" dirty="0" smtClean="0">
+              <a:solidFill>
+                <a:srgbClr val="C00000"/>
+              </a:solidFill>
+              <a:latin typeface="+mn-ea"/>
+            </a:endParaRPr>
+          </a:p>
+          <a:p>
+            <a:r>
+              <a:rPr lang="ko-KR" altLang="en-US" sz="1400" dirty="0" smtClean="0">
+                <a:latin typeface="+mn-ea"/>
+              </a:rPr>
+              <a:t>군집화는 </a:t>
+            </a:r>
+            <a:r>
+              <a:rPr lang="ko-KR" altLang="en-US" sz="1400" b="1" dirty="0" smtClean="0">
+                <a:latin typeface="+mn-ea"/>
+              </a:rPr>
+              <a:t>어떤 대상을 구분하여 그룹을 만드는 것</a:t>
+            </a:r>
+            <a:r>
+              <a:rPr lang="ko-KR" altLang="en-US" sz="1400" dirty="0" smtClean="0">
+                <a:latin typeface="+mn-ea"/>
+              </a:rPr>
+              <a:t>이라면</a:t>
+            </a:r>
+            <a:r>
+              <a:rPr lang="en-US" altLang="ko-KR" sz="1400" dirty="0" smtClean="0">
+                <a:latin typeface="+mn-ea"/>
+              </a:rPr>
+              <a:t>,</a:t>
+            </a:r>
+          </a:p>
+          <a:p>
+            <a:r>
+              <a:rPr lang="ko-KR" altLang="en-US" sz="1400" dirty="0" smtClean="0">
+                <a:latin typeface="+mn-ea"/>
+              </a:rPr>
+              <a:t>분류는 </a:t>
+            </a:r>
+            <a:r>
+              <a:rPr lang="ko-KR" altLang="en-US" sz="1400" b="1" dirty="0" smtClean="0">
+                <a:latin typeface="+mn-ea"/>
+              </a:rPr>
+              <a:t>어떤 대상이 어떤 그룹에 속하는지 판단</a:t>
+            </a:r>
+            <a:r>
+              <a:rPr lang="ko-KR" altLang="en-US" sz="1400" dirty="0" smtClean="0">
+                <a:latin typeface="+mn-ea"/>
+              </a:rPr>
+              <a:t>하는 것</a:t>
+            </a:r>
+            <a:r>
+              <a:rPr lang="en-US" altLang="ko-KR" sz="1400" dirty="0" smtClean="0">
+                <a:latin typeface="+mn-ea"/>
+              </a:rPr>
+              <a:t>!</a:t>
+            </a:r>
+            <a:endParaRPr lang="ko-KR" altLang="en-US" sz="1400" dirty="0">
+              <a:latin typeface="+mn-ea"/>
+            </a:endParaRPr>
+          </a:p>
+        </p:txBody>
+      </p:sp>
+      <p:sp>
+        <p:nvSpPr>
+          <p:cNvPr id="11" name="TextBox 10"/>
+          <p:cNvSpPr txBox="1"/>
+          <p:nvPr/>
+        </p:nvSpPr>
+        <p:spPr>
+          <a:xfrm>
+            <a:off x="2348136" y="5026333"/>
+            <a:ext cx="5814412" cy="954107"/>
+          </a:xfrm>
+          <a:prstGeom prst="rect">
+            <a:avLst/>
+          </a:prstGeom>
+          <a:noFill/>
+        </p:spPr>
+        <p:txBody>
+          <a:bodyPr wrap="none" rtlCol="0">
+            <a:spAutoFit/>
+          </a:bodyPr>
+          <a:lstStyle/>
+          <a:p>
+            <a:r>
+              <a:rPr lang="ko-KR" altLang="en-US" sz="1400" dirty="0" smtClean="0">
+                <a:latin typeface="+mn-ea"/>
+              </a:rPr>
+              <a:t>독립 변수들의 차원을 축소화</a:t>
+            </a:r>
+            <a:endParaRPr lang="en-US" altLang="ko-KR" sz="1400" dirty="0" smtClean="0">
+              <a:latin typeface="+mn-ea"/>
+            </a:endParaRPr>
+          </a:p>
+          <a:p>
+            <a:endParaRPr lang="en-US" altLang="ko-KR" sz="1400" dirty="0">
+              <a:latin typeface="+mn-ea"/>
+            </a:endParaRPr>
+          </a:p>
+          <a:p>
+            <a:r>
+              <a:rPr lang="ko-KR" altLang="en-US" sz="1400" dirty="0" smtClean="0">
+                <a:latin typeface="+mn-ea"/>
+              </a:rPr>
+              <a:t>여러 변수 간 존재하는 상관 관계를 이용하여</a:t>
+            </a:r>
+            <a:r>
+              <a:rPr lang="en-US" altLang="ko-KR" sz="1400" dirty="0" smtClean="0">
+                <a:latin typeface="+mn-ea"/>
+              </a:rPr>
+              <a:t>,</a:t>
+            </a:r>
+            <a:r>
+              <a:rPr lang="ko-KR" altLang="en-US" sz="1400" dirty="0" smtClean="0">
+                <a:latin typeface="+mn-ea"/>
+              </a:rPr>
+              <a:t> 이를 대표하는 주성분을</a:t>
+            </a:r>
+            <a:endParaRPr lang="en-US" altLang="ko-KR" sz="1400" dirty="0" smtClean="0">
+              <a:latin typeface="+mn-ea"/>
+            </a:endParaRPr>
+          </a:p>
+          <a:p>
+            <a:r>
+              <a:rPr lang="ko-KR" altLang="en-US" sz="1400" dirty="0" smtClean="0">
+                <a:latin typeface="+mn-ea"/>
+              </a:rPr>
+              <a:t>추출해 차원을 축소하는 기법</a:t>
+            </a:r>
+            <a:endParaRPr lang="en-US" altLang="ko-KR" sz="1400" dirty="0" smtClean="0">
+              <a:latin typeface="+mn-ea"/>
+            </a:endParaRPr>
+          </a:p>
+        </p:txBody>
+      </p:sp>
+    </p:spTree>
+    <p:extLst>
+      <p:ext uri="{BB962C8B-B14F-4D97-AF65-F5344CB8AC3E}">
+        <p14:creationId xmlns:p14="http://schemas.microsoft.com/office/powerpoint/2010/main" val="2015218420"/>
+      </p:ext>
+    </p:extLst>
+  </p:cSld>
+  <p:clrMapOvr>
+    <a:masterClrMapping/>
+  </p:clrMapOvr>
+  <p:timing>
+    <p:tnLst>
+      <p:par>
+        <p:cTn id="1" dur="indefinite" restart="never" nodeType="tmRoot"/>
+      </p:par>
+    </p:tnLst>
+  </p:timing>
+</p:sld>
+</file>
+
+<file path=ppt/slides/slide6.xml><?xml version="1.0" encoding="utf-8"?>
+<p:sld xmlns:a="http://schemas.openxmlformats.org/drawingml/2006/main" xmlns:r="http://schemas.openxmlformats.org/officeDocument/2006/relationships" xmlns:p="http://schemas.openxmlformats.org/presentationml/2006/main">
+  <p:cSld>
+    <p:spTree>
+      <p:nvGrpSpPr>
+        <p:cNvPr id="1" name=""/>
+        <p:cNvGrpSpPr/>
+        <p:nvPr/>
+      </p:nvGrpSpPr>
+      <p:grpSpPr>
+        <a:xfrm>
+          <a:off x="0" y="0"/>
+          <a:ext cx="0" cy="0"/>
+          <a:chOff x="0" y="0"/>
+          <a:chExt cx="0" cy="0"/>
+        </a:xfrm>
+      </p:grpSpPr>
+      <p:sp>
+        <p:nvSpPr>
+          <p:cNvPr id="2" name="제목 1"/>
+          <p:cNvSpPr>
+            <a:spLocks noGrp="1"/>
+          </p:cNvSpPr>
+          <p:nvPr>
+            <p:ph type="title"/>
+          </p:nvPr>
+        </p:nvSpPr>
+        <p:spPr/>
+        <p:txBody>
+          <a:bodyPr>
+            <a:normAutofit/>
+          </a:bodyPr>
+          <a:lstStyle/>
+          <a:p>
+            <a:r>
+              <a:rPr lang="en-US" altLang="ko-KR" sz="3600" b="1" dirty="0" smtClean="0">
+                <a:latin typeface="+mn-ea"/>
+                <a:ea typeface="+mn-ea"/>
+              </a:rPr>
+              <a:t>02. </a:t>
+            </a:r>
+            <a:r>
+              <a:rPr lang="ko-KR" altLang="en-US" sz="3600" b="1" dirty="0" smtClean="0">
+                <a:latin typeface="+mn-ea"/>
+                <a:ea typeface="+mn-ea"/>
+              </a:rPr>
+              <a:t>지도 학습과 비지도 학습</a:t>
+            </a:r>
+            <a:endParaRPr lang="ko-KR" altLang="en-US" sz="3600" b="1" dirty="0">
+              <a:latin typeface="+mn-ea"/>
+              <a:ea typeface="+mn-ea"/>
+            </a:endParaRPr>
+          </a:p>
+        </p:txBody>
+      </p:sp>
+      <p:sp>
+        <p:nvSpPr>
+          <p:cNvPr id="4" name="내용 개체 틀 3"/>
+          <p:cNvSpPr>
+            <a:spLocks noGrp="1"/>
+          </p:cNvSpPr>
+          <p:nvPr>
+            <p:ph sz="quarter" idx="1"/>
+          </p:nvPr>
+        </p:nvSpPr>
+        <p:spPr>
+          <a:xfrm>
+            <a:off x="467544" y="1368490"/>
+            <a:ext cx="8229600" cy="4937760"/>
+          </a:xfrm>
+        </p:spPr>
+        <p:txBody>
+          <a:bodyPr>
+            <a:normAutofit/>
+          </a:bodyPr>
+          <a:lstStyle/>
+          <a:p>
+            <a:pPr>
+              <a:lnSpc>
+                <a:spcPct val="150000"/>
+              </a:lnSpc>
+            </a:pPr>
+            <a:r>
+              <a:rPr lang="ko-KR" altLang="en-US" sz="2000" b="1" dirty="0" smtClean="0"/>
+              <a:t>강화 학습</a:t>
+            </a:r>
+            <a:r>
+              <a:rPr lang="en-US" altLang="ko-KR" sz="2000" b="1" dirty="0" smtClean="0"/>
+              <a:t>(Reinforcement Learning)</a:t>
+            </a:r>
+          </a:p>
+          <a:p>
+            <a:pPr marL="0" indent="0">
+              <a:lnSpc>
+                <a:spcPct val="150000"/>
+              </a:lnSpc>
+              <a:buNone/>
+            </a:pPr>
+            <a:r>
+              <a:rPr lang="en-US" altLang="ko-KR" sz="1600" dirty="0" smtClean="0">
+                <a:latin typeface="+mn-ea"/>
+              </a:rPr>
+              <a:t>: </a:t>
+            </a:r>
+            <a:r>
+              <a:rPr lang="ko-KR" altLang="en-US" sz="1600" dirty="0" smtClean="0">
+                <a:latin typeface="+mn-ea"/>
+              </a:rPr>
+              <a:t>수많은 시뮬레이션을 통해 현재의 선택이 먼 미래에 보상이 최대가 되도록 학습</a:t>
+            </a:r>
+            <a:endParaRPr lang="en-US" altLang="ko-KR" sz="1600" dirty="0" smtClean="0">
+              <a:latin typeface="+mn-ea"/>
+            </a:endParaRPr>
+          </a:p>
+          <a:p>
+            <a:pPr marL="0" indent="0">
+              <a:lnSpc>
+                <a:spcPct val="150000"/>
+              </a:lnSpc>
+              <a:buNone/>
+            </a:pPr>
+            <a:r>
+              <a:rPr lang="ko-KR" altLang="en-US" sz="1600" dirty="0" smtClean="0">
+                <a:latin typeface="+mn-ea"/>
+              </a:rPr>
+              <a:t>  ☞ </a:t>
+            </a:r>
+            <a:r>
+              <a:rPr lang="ko-KR" altLang="en-US" sz="1600" b="1" u="sng" dirty="0" smtClean="0">
+                <a:latin typeface="+mn-ea"/>
+              </a:rPr>
+              <a:t>더 많은 보상</a:t>
+            </a:r>
+            <a:r>
+              <a:rPr lang="ko-KR" altLang="en-US" sz="1600" dirty="0" smtClean="0">
+                <a:latin typeface="+mn-ea"/>
+              </a:rPr>
+              <a:t>을 받을 수 있는 </a:t>
+            </a:r>
+            <a:r>
+              <a:rPr lang="ko-KR" altLang="en-US" sz="1600" b="1" dirty="0" smtClean="0">
+                <a:solidFill>
+                  <a:srgbClr val="C00000"/>
+                </a:solidFill>
+                <a:latin typeface="+mn-ea"/>
+              </a:rPr>
+              <a:t>정책</a:t>
+            </a:r>
+            <a:r>
+              <a:rPr lang="en-US" altLang="ko-KR" sz="1600" b="1" dirty="0" smtClean="0">
+                <a:solidFill>
+                  <a:srgbClr val="C00000"/>
+                </a:solidFill>
+                <a:latin typeface="+mn-ea"/>
+              </a:rPr>
+              <a:t>(Policy)</a:t>
+            </a:r>
+            <a:r>
+              <a:rPr lang="ko-KR" altLang="en-US" sz="1600" b="1" dirty="0" smtClean="0">
+                <a:solidFill>
+                  <a:srgbClr val="C00000"/>
+                </a:solidFill>
+                <a:latin typeface="+mn-ea"/>
+              </a:rPr>
+              <a:t>을 만드는 것</a:t>
+            </a:r>
+            <a:r>
+              <a:rPr lang="ko-KR" altLang="en-US" sz="1600" dirty="0" smtClean="0">
+                <a:latin typeface="+mn-ea"/>
+              </a:rPr>
+              <a:t>이 핵심</a:t>
+            </a:r>
+            <a:r>
+              <a:rPr lang="en-US" altLang="ko-KR" sz="1600" dirty="0" smtClean="0">
+                <a:latin typeface="+mn-ea"/>
+              </a:rPr>
+              <a:t>! (ex. </a:t>
+            </a:r>
+            <a:r>
+              <a:rPr lang="ko-KR" altLang="en-US" sz="1600" dirty="0" smtClean="0">
+                <a:latin typeface="+mn-ea"/>
+              </a:rPr>
+              <a:t>알파고</a:t>
+            </a:r>
+            <a:r>
+              <a:rPr lang="en-US" altLang="ko-KR" sz="1600" dirty="0" smtClean="0">
+                <a:latin typeface="+mn-ea"/>
+              </a:rPr>
+              <a:t>)</a:t>
+            </a:r>
+          </a:p>
+          <a:p>
+            <a:pPr marL="0" indent="0">
+              <a:buNone/>
+            </a:pPr>
+            <a:endParaRPr lang="ko-KR" altLang="en-US" sz="2000" dirty="0">
+              <a:latin typeface="+mn-ea"/>
+            </a:endParaRPr>
+          </a:p>
+        </p:txBody>
+      </p:sp>
+      <p:pic>
+        <p:nvPicPr>
+          <p:cNvPr id="2050" name="Picture 2"/>
+          <p:cNvPicPr>
+            <a:picLocks noChangeAspect="1" noChangeArrowheads="1"/>
+          </p:cNvPicPr>
+          <p:nvPr/>
+        </p:nvPicPr>
+        <p:blipFill>
+          <a:blip r:embed="rId2">
+            <a:extLst>
+              <a:ext uri="{28A0092B-C50C-407E-A947-70E740481C1C}">
+                <a14:useLocalDpi xmlns:a14="http://schemas.microsoft.com/office/drawing/2010/main" val="0"/>
+              </a:ext>
+            </a:extLst>
+          </a:blip>
+          <a:srcRect/>
+          <a:stretch>
+            <a:fillRect/>
+          </a:stretch>
+        </p:blipFill>
+        <p:spPr bwMode="auto">
+          <a:xfrm>
+            <a:off x="957604" y="3314199"/>
+            <a:ext cx="4968552" cy="2317692"/>
+          </a:xfrm>
+          <a:prstGeom prst="rect">
+            <a:avLst/>
+          </a:prstGeom>
+          <a:noFill/>
+          <a:ln>
+            <a:noFill/>
+          </a:ln>
+          <a:extLst>
+            <a:ext uri="{909E8E84-426E-40DD-AFC4-6F175D3DCCD1}">
+              <a14:hiddenFill xmlns:a14="http://schemas.microsoft.com/office/drawing/2010/main">
+                <a:solidFill>
+                  <a:schemeClr val="accent1"/>
+                </a:solidFill>
+              </a14:hiddenFill>
+            </a:ext>
+            <a:ext uri="{91240B29-F687-4F45-9708-019B960494DF}">
+              <a14:hiddenLine xmlns:a14="http://schemas.microsoft.com/office/drawing/2010/main" w="9525">
+                <a:solidFill>
+                  <a:schemeClr val="tx1"/>
+                </a:solidFill>
+                <a:miter lim="800000"/>
+                <a:headEnd/>
+                <a:tailEnd/>
+              </a14:hiddenLine>
+            </a:ext>
+          </a:extLst>
+        </p:spPr>
+      </p:pic>
+      <p:sp>
+        <p:nvSpPr>
+          <p:cNvPr id="6" name="TextBox 5"/>
+          <p:cNvSpPr txBox="1"/>
+          <p:nvPr/>
+        </p:nvSpPr>
+        <p:spPr>
+          <a:xfrm>
+            <a:off x="3981940" y="3445598"/>
+            <a:ext cx="1858522" cy="276999"/>
+          </a:xfrm>
+          <a:prstGeom prst="rect">
+            <a:avLst/>
+          </a:prstGeom>
+          <a:noFill/>
+        </p:spPr>
+        <p:txBody>
+          <a:bodyPr wrap="none" rtlCol="0">
+            <a:spAutoFit/>
+          </a:bodyPr>
+          <a:lstStyle/>
+          <a:p>
+            <a:r>
+              <a:rPr lang="en-US" altLang="ko-KR" sz="1200" dirty="0" smtClean="0"/>
+              <a:t>01. Agent</a:t>
+            </a:r>
+            <a:r>
+              <a:rPr lang="ko-KR" altLang="en-US" sz="1200" dirty="0" smtClean="0"/>
+              <a:t>가 </a:t>
+            </a:r>
+            <a:r>
+              <a:rPr lang="en-US" altLang="ko-KR" sz="1200" dirty="0" smtClean="0"/>
+              <a:t>Action</a:t>
+            </a:r>
+            <a:r>
+              <a:rPr lang="ko-KR" altLang="en-US" sz="1200" dirty="0" smtClean="0"/>
+              <a:t>을 취함</a:t>
+            </a:r>
+            <a:endParaRPr lang="ko-KR" altLang="en-US" sz="1200" dirty="0"/>
+          </a:p>
+        </p:txBody>
+      </p:sp>
+      <p:sp>
+        <p:nvSpPr>
+          <p:cNvPr id="10" name="TextBox 9"/>
+          <p:cNvSpPr txBox="1"/>
+          <p:nvPr/>
+        </p:nvSpPr>
+        <p:spPr>
+          <a:xfrm>
+            <a:off x="2448026" y="4207331"/>
+            <a:ext cx="2463175" cy="276999"/>
+          </a:xfrm>
+          <a:prstGeom prst="rect">
+            <a:avLst/>
+          </a:prstGeom>
+          <a:noFill/>
+        </p:spPr>
+        <p:txBody>
+          <a:bodyPr wrap="none" rtlCol="0">
+            <a:spAutoFit/>
+          </a:bodyPr>
+          <a:lstStyle/>
+          <a:p>
+            <a:r>
+              <a:rPr lang="en-US" altLang="ko-KR" sz="1200" dirty="0" smtClean="0"/>
+              <a:t>02. </a:t>
+            </a:r>
+            <a:r>
+              <a:rPr lang="ko-KR" altLang="en-US" sz="1200" dirty="0" smtClean="0"/>
+              <a:t>정책에 따른 상과 벌이 주어짐</a:t>
+            </a:r>
+            <a:endParaRPr lang="ko-KR" altLang="en-US" sz="1200" dirty="0"/>
+          </a:p>
+        </p:txBody>
+      </p:sp>
+      <p:sp>
+        <p:nvSpPr>
+          <p:cNvPr id="12" name="TextBox 11"/>
+          <p:cNvSpPr txBox="1"/>
+          <p:nvPr/>
+        </p:nvSpPr>
+        <p:spPr>
+          <a:xfrm>
+            <a:off x="957604" y="3152000"/>
+            <a:ext cx="3113353" cy="276999"/>
+          </a:xfrm>
+          <a:prstGeom prst="rect">
+            <a:avLst/>
+          </a:prstGeom>
+          <a:noFill/>
+        </p:spPr>
+        <p:txBody>
+          <a:bodyPr wrap="none" rtlCol="0">
+            <a:spAutoFit/>
+          </a:bodyPr>
+          <a:lstStyle/>
+          <a:p>
+            <a:r>
+              <a:rPr lang="en-US" altLang="ko-KR" sz="1200" dirty="0" smtClean="0"/>
+              <a:t>03.Agent</a:t>
+            </a:r>
+            <a:r>
+              <a:rPr lang="ko-KR" altLang="en-US" sz="1200" dirty="0" smtClean="0"/>
+              <a:t>는 보상과 함께 해당 상태를 인지함</a:t>
+            </a:r>
+            <a:endParaRPr lang="ko-KR" altLang="en-US" sz="1200" dirty="0"/>
+          </a:p>
+        </p:txBody>
+      </p:sp>
+    </p:spTree>
+    <p:extLst>
+      <p:ext uri="{BB962C8B-B14F-4D97-AF65-F5344CB8AC3E}">
+        <p14:creationId xmlns:p14="http://schemas.microsoft.com/office/powerpoint/2010/main" val="500015660"/>
+      </p:ext>
+    </p:extLst>
+  </p:cSld>
+  <p:clrMapOvr>
+    <a:masterClrMapping/>
+  </p:clrMapOvr>
+  <p:timing>
+    <p:tnLst>
+      <p:par>
+        <p:cTn id="1" dur="indefinite" restart="never" nodeType="tmRoot"/>
+      </p:par>
+    </p:tnLst>
+  </p:timing>
+</p:sld>
+</file>
+
+<file path=ppt/slides/slide7.xml><?xml version="1.0" encoding="utf-8"?>
+<p:sld xmlns:a="http://schemas.openxmlformats.org/drawingml/2006/main" xmlns:r="http://schemas.openxmlformats.org/officeDocument/2006/relationships" xmlns:p="http://schemas.openxmlformats.org/presentationml/2006/main">
+  <p:cSld>
+    <p:spTree>
+      <p:nvGrpSpPr>
+        <p:cNvPr id="1" name=""/>
+        <p:cNvGrpSpPr/>
+        <p:nvPr/>
+      </p:nvGrpSpPr>
+      <p:grpSpPr>
+        <a:xfrm>
+          <a:off x="0" y="0"/>
+          <a:ext cx="0" cy="0"/>
+          <a:chOff x="0" y="0"/>
+          <a:chExt cx="0" cy="0"/>
+        </a:xfrm>
+      </p:grpSpPr>
+      <p:sp>
+        <p:nvSpPr>
+          <p:cNvPr id="2" name="제목 1"/>
+          <p:cNvSpPr>
+            <a:spLocks noGrp="1"/>
+          </p:cNvSpPr>
+          <p:nvPr>
+            <p:ph type="title"/>
+          </p:nvPr>
+        </p:nvSpPr>
+        <p:spPr/>
+        <p:txBody>
+          <a:bodyPr>
+            <a:normAutofit/>
+          </a:bodyPr>
+          <a:lstStyle/>
+          <a:p>
+            <a:r>
+              <a:rPr lang="en-US" altLang="ko-KR" sz="3600" b="1" dirty="0" smtClean="0">
+                <a:latin typeface="+mn-ea"/>
+                <a:ea typeface="+mn-ea"/>
+              </a:rPr>
+              <a:t>02. </a:t>
+            </a:r>
+            <a:r>
+              <a:rPr lang="ko-KR" altLang="en-US" sz="3600" b="1" dirty="0" smtClean="0">
+                <a:latin typeface="+mn-ea"/>
+                <a:ea typeface="+mn-ea"/>
+              </a:rPr>
+              <a:t>지도 학습과 비지도 학습</a:t>
+            </a:r>
+            <a:endParaRPr lang="ko-KR" altLang="en-US" sz="3600" b="1" dirty="0">
+              <a:latin typeface="+mn-ea"/>
+              <a:ea typeface="+mn-ea"/>
+            </a:endParaRPr>
+          </a:p>
+        </p:txBody>
+      </p:sp>
+      <p:sp>
+        <p:nvSpPr>
+          <p:cNvPr id="4" name="내용 개체 틀 3"/>
+          <p:cNvSpPr>
+            <a:spLocks noGrp="1"/>
+          </p:cNvSpPr>
+          <p:nvPr>
+            <p:ph sz="quarter" idx="1"/>
+          </p:nvPr>
+        </p:nvSpPr>
+        <p:spPr>
+          <a:xfrm>
+            <a:off x="467544" y="1368490"/>
+            <a:ext cx="8229600" cy="4937760"/>
+          </a:xfrm>
+        </p:spPr>
+        <p:txBody>
+          <a:bodyPr>
+            <a:normAutofit/>
+          </a:bodyPr>
+          <a:lstStyle/>
+          <a:p>
+            <a:pPr>
+              <a:lnSpc>
+                <a:spcPct val="150000"/>
+              </a:lnSpc>
+            </a:pPr>
+            <a:r>
+              <a:rPr lang="ko-KR" altLang="en-US" sz="2000" b="1" dirty="0" smtClean="0"/>
+              <a:t>지도 학습</a:t>
+            </a:r>
+            <a:r>
+              <a:rPr lang="en-US" altLang="ko-KR" sz="2000" b="1" dirty="0" smtClean="0"/>
+              <a:t>/</a:t>
+            </a:r>
+            <a:r>
+              <a:rPr lang="ko-KR" altLang="en-US" sz="2000" b="1" dirty="0" smtClean="0"/>
+              <a:t>비지도 학습</a:t>
+            </a:r>
+            <a:r>
+              <a:rPr lang="en-US" altLang="ko-KR" sz="2000" b="1" dirty="0" smtClean="0"/>
+              <a:t>/</a:t>
+            </a:r>
+            <a:r>
+              <a:rPr lang="ko-KR" altLang="en-US" sz="2000" b="1" dirty="0" smtClean="0"/>
+              <a:t>강화 학습 예시</a:t>
+            </a:r>
+            <a:endParaRPr lang="en-US" altLang="ko-KR" sz="2000" b="1" dirty="0" smtClean="0"/>
+          </a:p>
+        </p:txBody>
+      </p:sp>
+      <p:pic>
+        <p:nvPicPr>
+          <p:cNvPr id="3074" name="Picture 2"/>
+          <p:cNvPicPr>
+            <a:picLocks noChangeAspect="1" noChangeArrowheads="1"/>
+          </p:cNvPicPr>
+          <p:nvPr/>
+        </p:nvPicPr>
+        <p:blipFill>
+          <a:blip r:embed="rId2">
+            <a:extLst>
+              <a:ext uri="{28A0092B-C50C-407E-A947-70E740481C1C}">
+                <a14:useLocalDpi xmlns:a14="http://schemas.microsoft.com/office/drawing/2010/main" val="0"/>
+              </a:ext>
+            </a:extLst>
+          </a:blip>
+          <a:srcRect/>
+          <a:stretch>
+            <a:fillRect/>
+          </a:stretch>
+        </p:blipFill>
+        <p:spPr bwMode="auto">
+          <a:xfrm>
+            <a:off x="539551" y="2060848"/>
+            <a:ext cx="8355793" cy="3981450"/>
+          </a:xfrm>
+          <a:prstGeom prst="rect">
+            <a:avLst/>
+          </a:prstGeom>
+          <a:noFill/>
+          <a:ln>
+            <a:noFill/>
+          </a:ln>
+          <a:extLst>
+            <a:ext uri="{909E8E84-426E-40DD-AFC4-6F175D3DCCD1}">
+              <a14:hiddenFill xmlns:a14="http://schemas.microsoft.com/office/drawing/2010/main">
+                <a:solidFill>
+                  <a:schemeClr val="accent1"/>
+                </a:solidFill>
+              </a14:hiddenFill>
+            </a:ext>
+            <a:ext uri="{91240B29-F687-4F45-9708-019B960494DF}">
+              <a14:hiddenLine xmlns:a14="http://schemas.microsoft.com/office/drawing/2010/main" w="9525">
+                <a:solidFill>
+                  <a:schemeClr val="tx1"/>
+                </a:solidFill>
+                <a:miter lim="800000"/>
+                <a:headEnd/>
+                <a:tailEnd/>
+              </a14:hiddenLine>
+            </a:ext>
+          </a:extLst>
+        </p:spPr>
+      </p:pic>
+    </p:spTree>
+    <p:extLst>
+      <p:ext uri="{BB962C8B-B14F-4D97-AF65-F5344CB8AC3E}">
+        <p14:creationId xmlns:p14="http://schemas.microsoft.com/office/powerpoint/2010/main" val="4197667196"/>
+      </p:ext>
+    </p:extLst>
+  </p:cSld>
+  <p:clrMapOvr>
+    <a:masterClrMapping/>
+  </p:clrMapOvr>
+  <p:timing>
+    <p:tnLst>
+      <p:par>
+        <p:cTn id="1" dur="indefinite" restart="never" nodeType="tmRoot"/>
+      </p:par>
+    </p:tnLst>
+  </p:timing>
+</p:sld>
+</file>
+
+<file path=ppt/slides/slide8.xml><?xml version="1.0" encoding="utf-8"?>
+<p:sld xmlns:a="http://schemas.openxmlformats.org/drawingml/2006/main" xmlns:r="http://schemas.openxmlformats.org/officeDocument/2006/relationships" xmlns:p="http://schemas.openxmlformats.org/presentationml/2006/main">
+  <p:cSld>
+    <p:spTree>
+      <p:nvGrpSpPr>
+        <p:cNvPr id="1" name=""/>
+        <p:cNvGrpSpPr/>
+        <p:nvPr/>
+      </p:nvGrpSpPr>
+      <p:grpSpPr>
+        <a:xfrm>
+          <a:off x="0" y="0"/>
+          <a:ext cx="0" cy="0"/>
+          <a:chOff x="0" y="0"/>
+          <a:chExt cx="0" cy="0"/>
+        </a:xfrm>
+      </p:grpSpPr>
+      <p:sp>
+        <p:nvSpPr>
+          <p:cNvPr id="2" name="제목 1"/>
+          <p:cNvSpPr>
+            <a:spLocks noGrp="1"/>
+          </p:cNvSpPr>
+          <p:nvPr>
+            <p:ph type="title"/>
+          </p:nvPr>
+        </p:nvSpPr>
+        <p:spPr/>
+        <p:txBody>
+          <a:bodyPr>
+            <a:normAutofit/>
+          </a:bodyPr>
+          <a:lstStyle/>
+          <a:p>
+            <a:r>
+              <a:rPr lang="en-US" altLang="ko-KR" sz="3600" b="1" dirty="0" smtClean="0">
+                <a:latin typeface="+mn-ea"/>
+                <a:ea typeface="+mn-ea"/>
+              </a:rPr>
+              <a:t>03. Machine Learning </a:t>
+            </a:r>
+            <a:r>
+              <a:rPr lang="ko-KR" altLang="en-US" sz="3600" b="1" dirty="0" smtClean="0">
+                <a:latin typeface="+mn-ea"/>
+                <a:ea typeface="+mn-ea"/>
+              </a:rPr>
+              <a:t>종류</a:t>
+            </a:r>
+            <a:endParaRPr lang="ko-KR" altLang="en-US" sz="3600" b="1" dirty="0">
+              <a:latin typeface="+mn-ea"/>
+              <a:ea typeface="+mn-ea"/>
+            </a:endParaRPr>
+          </a:p>
+        </p:txBody>
+      </p:sp>
+      <p:sp>
+        <p:nvSpPr>
+          <p:cNvPr id="4" name="내용 개체 틀 3"/>
+          <p:cNvSpPr>
+            <a:spLocks noGrp="1"/>
+          </p:cNvSpPr>
+          <p:nvPr>
+            <p:ph sz="quarter" idx="1"/>
+          </p:nvPr>
+        </p:nvSpPr>
+        <p:spPr>
+          <a:xfrm>
+            <a:off x="467544" y="1368490"/>
+            <a:ext cx="8229600" cy="4937760"/>
+          </a:xfrm>
+        </p:spPr>
+        <p:txBody>
+          <a:bodyPr>
+            <a:normAutofit/>
+          </a:bodyPr>
+          <a:lstStyle/>
+          <a:p>
+            <a:pPr>
+              <a:lnSpc>
+                <a:spcPct val="150000"/>
+              </a:lnSpc>
+            </a:pPr>
+            <a:r>
+              <a:rPr lang="en-US" altLang="ko-KR" sz="2000" b="1" dirty="0" smtClean="0"/>
+              <a:t>Machine Learning </a:t>
+            </a:r>
+            <a:r>
+              <a:rPr lang="ko-KR" altLang="en-US" sz="2000" b="1" dirty="0" smtClean="0"/>
+              <a:t>종류 요약</a:t>
+            </a:r>
+            <a:endParaRPr lang="en-US" altLang="ko-KR" sz="2000" b="1" dirty="0" smtClean="0"/>
+          </a:p>
+        </p:txBody>
+      </p:sp>
+      <p:graphicFrame>
+        <p:nvGraphicFramePr>
+          <p:cNvPr id="3" name="표 2"/>
+          <p:cNvGraphicFramePr>
+            <a:graphicFrameLocks noGrp="1"/>
+          </p:cNvGraphicFramePr>
+          <p:nvPr>
+            <p:extLst>
+              <p:ext uri="{D42A27DB-BD31-4B8C-83A1-F6EECF244321}">
+                <p14:modId xmlns:p14="http://schemas.microsoft.com/office/powerpoint/2010/main" val="498707471"/>
+              </p:ext>
+            </p:extLst>
+          </p:nvPr>
+        </p:nvGraphicFramePr>
+        <p:xfrm>
+          <a:off x="683568" y="2132856"/>
+          <a:ext cx="7776864" cy="3581400"/>
+        </p:xfrm>
+        <a:graphic>
+          <a:graphicData uri="http://schemas.openxmlformats.org/drawingml/2006/table">
+            <a:tbl>
+              <a:tblPr firstRow="1" bandRow="1">
+                <a:tableStyleId>{5C22544A-7EE6-4342-B048-85BDC9FD1C3A}</a:tableStyleId>
+              </a:tblPr>
+              <a:tblGrid>
+                <a:gridCol w="2520280"/>
+                <a:gridCol w="5256584"/>
+              </a:tblGrid>
+              <a:tr h="370840">
+                <a:tc>
+                  <a:txBody>
+                    <a:bodyPr/>
+                    <a:lstStyle/>
+                    <a:p>
+                      <a:pPr algn="ctr" latinLnBrk="1"/>
+                      <a:r>
+                        <a:rPr lang="ko-KR" altLang="en-US" sz="1200" dirty="0" smtClean="0">
+                          <a:latin typeface="+mn-ea"/>
+                          <a:ea typeface="+mn-ea"/>
+                        </a:rPr>
+                        <a:t>종류</a:t>
+                      </a:r>
+                      <a:endParaRPr lang="ko-KR" altLang="en-US" sz="1200" dirty="0">
+                        <a:latin typeface="+mn-ea"/>
+                        <a:ea typeface="+mn-ea"/>
+                      </a:endParaRPr>
+                    </a:p>
+                  </a:txBody>
+                  <a:tcPr/>
+                </a:tc>
+                <a:tc>
+                  <a:txBody>
+                    <a:bodyPr/>
+                    <a:lstStyle/>
+                    <a:p>
+                      <a:pPr algn="ctr" latinLnBrk="1"/>
+                      <a:r>
+                        <a:rPr lang="ko-KR" altLang="en-US" sz="1200" dirty="0" smtClean="0">
+                          <a:latin typeface="+mn-ea"/>
+                          <a:ea typeface="+mn-ea"/>
+                        </a:rPr>
+                        <a:t>내용</a:t>
+                      </a:r>
+                      <a:endParaRPr lang="ko-KR" altLang="en-US" sz="1200" dirty="0">
+                        <a:latin typeface="+mn-ea"/>
+                        <a:ea typeface="+mn-ea"/>
+                      </a:endParaRPr>
+                    </a:p>
+                  </a:txBody>
+                  <a:tcPr/>
+                </a:tc>
+              </a:tr>
+              <a:tr h="370840">
+                <a:tc>
+                  <a:txBody>
+                    <a:bodyPr/>
+                    <a:lstStyle/>
+                    <a:p>
+                      <a:pPr latinLnBrk="1"/>
+                      <a:r>
+                        <a:rPr lang="ko-KR" altLang="en-US" sz="1200" dirty="0" smtClean="0">
+                          <a:latin typeface="+mn-ea"/>
+                          <a:ea typeface="+mn-ea"/>
+                        </a:rPr>
+                        <a:t>선형 회귀분석</a:t>
+                      </a:r>
+                      <a:endParaRPr lang="ko-KR" altLang="en-US" sz="1200" dirty="0">
+                        <a:latin typeface="+mn-ea"/>
+                        <a:ea typeface="+mn-ea"/>
+                      </a:endParaRPr>
+                    </a:p>
+                  </a:txBody>
+                  <a:tcPr/>
+                </a:tc>
+                <a:tc>
+                  <a:txBody>
+                    <a:bodyPr/>
+                    <a:lstStyle/>
+                    <a:p>
+                      <a:pPr latinLnBrk="1"/>
+                      <a:r>
+                        <a:rPr lang="ko-KR" altLang="en-US" sz="1200" dirty="0" smtClean="0">
+                          <a:latin typeface="+mn-ea"/>
+                          <a:ea typeface="+mn-ea"/>
+                        </a:rPr>
+                        <a:t>독립변수와 종속변수 간</a:t>
+                      </a:r>
+                      <a:r>
+                        <a:rPr lang="en-US" altLang="ko-KR" sz="1200" dirty="0" smtClean="0">
+                          <a:latin typeface="+mn-ea"/>
+                          <a:ea typeface="+mn-ea"/>
+                        </a:rPr>
+                        <a:t>, </a:t>
+                      </a:r>
+                      <a:r>
+                        <a:rPr lang="ko-KR" altLang="en-US" sz="1200" dirty="0" smtClean="0">
+                          <a:latin typeface="+mn-ea"/>
+                          <a:ea typeface="+mn-ea"/>
+                        </a:rPr>
+                        <a:t>선형적인 관계가 있다는 가정하에 분석</a:t>
+                      </a:r>
+                      <a:endParaRPr lang="en-US" altLang="ko-KR" sz="1200" dirty="0" smtClean="0">
+                        <a:latin typeface="+mn-ea"/>
+                        <a:ea typeface="+mn-ea"/>
+                      </a:endParaRPr>
+                    </a:p>
+                    <a:p>
+                      <a:pPr latinLnBrk="1"/>
+                      <a:r>
+                        <a:rPr lang="ko-KR" altLang="ko-KR" sz="1200" dirty="0" smtClean="0">
+                          <a:latin typeface="+mn-ea"/>
+                          <a:ea typeface="+mn-ea"/>
+                        </a:rPr>
+                        <a:t>☞</a:t>
+                      </a:r>
+                      <a:r>
+                        <a:rPr lang="en-US" altLang="ko-KR" sz="1200" dirty="0" smtClean="0">
+                          <a:latin typeface="+mn-ea"/>
+                          <a:ea typeface="+mn-ea"/>
+                        </a:rPr>
+                        <a:t> </a:t>
+                      </a:r>
+                      <a:r>
+                        <a:rPr lang="ko-KR" altLang="en-US" sz="1200" dirty="0" smtClean="0">
+                          <a:latin typeface="+mn-ea"/>
+                          <a:ea typeface="+mn-ea"/>
+                        </a:rPr>
+                        <a:t>직선을 통해 예측하기 때문에 독립변수의 중요도</a:t>
+                      </a:r>
+                      <a:r>
+                        <a:rPr lang="en-US" altLang="ko-KR" sz="1200" dirty="0" smtClean="0">
+                          <a:latin typeface="+mn-ea"/>
+                          <a:ea typeface="+mn-ea"/>
+                        </a:rPr>
+                        <a:t>,</a:t>
+                      </a:r>
+                      <a:r>
+                        <a:rPr lang="ko-KR" altLang="en-US" sz="1200" dirty="0" smtClean="0">
+                          <a:latin typeface="+mn-ea"/>
+                          <a:ea typeface="+mn-ea"/>
+                        </a:rPr>
+                        <a:t>영향도 파악이 용이</a:t>
+                      </a:r>
+                      <a:endParaRPr lang="ko-KR" altLang="en-US" sz="1200" dirty="0">
+                        <a:latin typeface="+mn-ea"/>
+                        <a:ea typeface="+mn-ea"/>
+                      </a:endParaRPr>
+                    </a:p>
+                  </a:txBody>
+                  <a:tcPr/>
+                </a:tc>
+              </a:tr>
+              <a:tr h="370840">
+                <a:tc>
+                  <a:txBody>
+                    <a:bodyPr/>
+                    <a:lstStyle/>
+                    <a:p>
+                      <a:pPr latinLnBrk="1"/>
+                      <a:r>
+                        <a:rPr lang="ko-KR" altLang="en-US" sz="1200" dirty="0" smtClean="0">
+                          <a:latin typeface="+mn-ea"/>
+                          <a:ea typeface="+mn-ea"/>
+                        </a:rPr>
+                        <a:t>의사결정나무</a:t>
+                      </a:r>
+                      <a:endParaRPr lang="ko-KR" altLang="en-US" sz="1200" dirty="0">
+                        <a:latin typeface="+mn-ea"/>
+                        <a:ea typeface="+mn-ea"/>
+                      </a:endParaRPr>
+                    </a:p>
+                  </a:txBody>
+                  <a:tcPr/>
+                </a:tc>
+                <a:tc>
+                  <a:txBody>
+                    <a:bodyPr/>
+                    <a:lstStyle/>
+                    <a:p>
+                      <a:pPr latinLnBrk="1"/>
+                      <a:r>
+                        <a:rPr lang="ko-KR" altLang="en-US" sz="1200" dirty="0" smtClean="0">
+                          <a:latin typeface="+mn-ea"/>
+                          <a:ea typeface="+mn-ea"/>
+                        </a:rPr>
+                        <a:t>독립변수의 조건에 따라 종속변수를 분리해 나감</a:t>
+                      </a:r>
+                      <a:r>
+                        <a:rPr lang="en-US" altLang="ko-KR" sz="1200" dirty="0" smtClean="0">
+                          <a:latin typeface="+mn-ea"/>
+                          <a:ea typeface="+mn-ea"/>
+                        </a:rPr>
+                        <a:t>(</a:t>
+                      </a:r>
+                      <a:r>
+                        <a:rPr lang="ko-KR" altLang="en-US" sz="1200" dirty="0" smtClean="0">
+                          <a:latin typeface="+mn-ea"/>
+                          <a:ea typeface="+mn-ea"/>
+                        </a:rPr>
+                        <a:t>비가 내림</a:t>
+                      </a:r>
+                      <a:r>
+                        <a:rPr lang="en-US" altLang="ko-KR" sz="1200" dirty="0" smtClean="0">
+                          <a:latin typeface="+mn-ea"/>
+                          <a:ea typeface="+mn-ea"/>
+                        </a:rPr>
+                        <a:t>-&gt;</a:t>
+                      </a:r>
+                      <a:r>
+                        <a:rPr lang="ko-KR" altLang="en-US" sz="1200" dirty="0" smtClean="0">
+                          <a:latin typeface="+mn-ea"/>
+                          <a:ea typeface="+mn-ea"/>
+                        </a:rPr>
+                        <a:t>소풍을 </a:t>
+                      </a:r>
+                      <a:r>
+                        <a:rPr lang="ko-KR" altLang="en-US" sz="1200" dirty="0" err="1" smtClean="0">
+                          <a:latin typeface="+mn-ea"/>
+                          <a:ea typeface="+mn-ea"/>
+                        </a:rPr>
+                        <a:t>못감</a:t>
+                      </a:r>
+                      <a:r>
+                        <a:rPr lang="en-US" altLang="ko-KR" sz="1200" dirty="0" smtClean="0">
+                          <a:latin typeface="+mn-ea"/>
+                          <a:ea typeface="+mn-ea"/>
+                        </a:rPr>
+                        <a:t>)</a:t>
+                      </a:r>
+                    </a:p>
+                    <a:p>
+                      <a:pPr latinLnBrk="1"/>
+                      <a:r>
+                        <a:rPr lang="ko-KR" altLang="ko-KR" sz="1200" dirty="0" smtClean="0">
+                          <a:latin typeface="+mn-ea"/>
+                          <a:ea typeface="+mn-ea"/>
+                        </a:rPr>
+                        <a:t>☞</a:t>
+                      </a:r>
+                      <a:r>
+                        <a:rPr lang="en-US" altLang="ko-KR" sz="1200" dirty="0" smtClean="0">
+                          <a:latin typeface="+mn-ea"/>
+                          <a:ea typeface="+mn-ea"/>
+                        </a:rPr>
+                        <a:t> </a:t>
+                      </a:r>
+                      <a:r>
+                        <a:rPr lang="ko-KR" altLang="en-US" sz="1200" dirty="0" smtClean="0">
+                          <a:latin typeface="+mn-ea"/>
+                          <a:ea typeface="+mn-ea"/>
+                        </a:rPr>
+                        <a:t>직관적인 해석이 가능하나</a:t>
+                      </a:r>
+                      <a:r>
+                        <a:rPr lang="en-US" altLang="ko-KR" sz="1200" dirty="0" smtClean="0">
+                          <a:latin typeface="+mn-ea"/>
+                          <a:ea typeface="+mn-ea"/>
+                        </a:rPr>
+                        <a:t>, </a:t>
+                      </a:r>
+                      <a:r>
+                        <a:rPr lang="ko-KR" altLang="en-US" sz="1200" dirty="0" err="1" smtClean="0">
+                          <a:latin typeface="+mn-ea"/>
+                          <a:ea typeface="+mn-ea"/>
+                        </a:rPr>
+                        <a:t>과적합</a:t>
+                      </a:r>
+                      <a:r>
+                        <a:rPr lang="en-US" altLang="ko-KR" sz="1200" dirty="0" smtClean="0">
+                          <a:latin typeface="+mn-ea"/>
+                          <a:ea typeface="+mn-ea"/>
+                        </a:rPr>
+                        <a:t>(Overfitting)</a:t>
+                      </a:r>
+                      <a:r>
+                        <a:rPr lang="ko-KR" altLang="en-US" sz="1200" dirty="0" smtClean="0">
+                          <a:latin typeface="+mn-ea"/>
+                          <a:ea typeface="+mn-ea"/>
+                        </a:rPr>
+                        <a:t>이 잘 일어남</a:t>
+                      </a:r>
+                      <a:endParaRPr lang="ko-KR" altLang="en-US" sz="1200" dirty="0">
+                        <a:latin typeface="+mn-ea"/>
+                        <a:ea typeface="+mn-ea"/>
+                      </a:endParaRPr>
+                    </a:p>
+                  </a:txBody>
+                  <a:tcPr/>
+                </a:tc>
+              </a:tr>
+              <a:tr h="370840">
+                <a:tc>
+                  <a:txBody>
+                    <a:bodyPr/>
+                    <a:lstStyle/>
+                    <a:p>
+                      <a:pPr latinLnBrk="1"/>
+                      <a:r>
+                        <a:rPr lang="en-US" altLang="ko-KR" sz="1200" dirty="0" smtClean="0">
+                          <a:latin typeface="+mn-ea"/>
+                          <a:ea typeface="+mn-ea"/>
+                        </a:rPr>
+                        <a:t>KNN(K-Nearest</a:t>
+                      </a:r>
+                      <a:r>
+                        <a:rPr lang="en-US" altLang="ko-KR" sz="1200" baseline="0" dirty="0" smtClean="0">
+                          <a:latin typeface="+mn-ea"/>
+                          <a:ea typeface="+mn-ea"/>
+                        </a:rPr>
+                        <a:t> Neighbor)</a:t>
+                      </a:r>
+                      <a:endParaRPr lang="ko-KR" altLang="en-US" sz="1200" dirty="0">
+                        <a:latin typeface="+mn-ea"/>
+                        <a:ea typeface="+mn-ea"/>
+                      </a:endParaRPr>
+                    </a:p>
+                  </a:txBody>
+                  <a:tcPr/>
+                </a:tc>
+                <a:tc>
+                  <a:txBody>
+                    <a:bodyPr/>
+                    <a:lstStyle/>
+                    <a:p>
+                      <a:pPr latinLnBrk="1"/>
+                      <a:r>
+                        <a:rPr lang="ko-KR" altLang="en-US" sz="1200" dirty="0" smtClean="0">
+                          <a:latin typeface="+mn-ea"/>
+                          <a:ea typeface="+mn-ea"/>
+                        </a:rPr>
+                        <a:t>새로 들어온 데이터의 주변 </a:t>
+                      </a:r>
+                      <a:r>
+                        <a:rPr lang="en-US" altLang="ko-KR" sz="1200" dirty="0" smtClean="0">
+                          <a:latin typeface="+mn-ea"/>
+                          <a:ea typeface="+mn-ea"/>
+                        </a:rPr>
+                        <a:t>K</a:t>
+                      </a:r>
+                      <a:r>
+                        <a:rPr lang="ko-KR" altLang="en-US" sz="1200" dirty="0" smtClean="0">
+                          <a:latin typeface="+mn-ea"/>
+                          <a:ea typeface="+mn-ea"/>
+                        </a:rPr>
+                        <a:t>개를 대상으로 범주</a:t>
+                      </a:r>
+                      <a:r>
+                        <a:rPr lang="en-US" altLang="ko-KR" sz="1200" dirty="0" smtClean="0">
+                          <a:latin typeface="+mn-ea"/>
+                          <a:ea typeface="+mn-ea"/>
+                        </a:rPr>
+                        <a:t>(Class)</a:t>
+                      </a:r>
+                      <a:r>
+                        <a:rPr lang="ko-KR" altLang="en-US" sz="1200" dirty="0" smtClean="0">
+                          <a:latin typeface="+mn-ea"/>
+                          <a:ea typeface="+mn-ea"/>
+                        </a:rPr>
+                        <a:t>를 분류</a:t>
+                      </a:r>
+                      <a:endParaRPr lang="en-US" altLang="ko-KR" sz="1200" dirty="0" smtClean="0">
+                        <a:latin typeface="+mn-ea"/>
+                        <a:ea typeface="+mn-ea"/>
+                      </a:endParaRPr>
+                    </a:p>
+                    <a:p>
+                      <a:pPr latinLnBrk="1"/>
+                      <a:r>
+                        <a:rPr lang="ko-KR" altLang="ko-KR" sz="1200" dirty="0" smtClean="0">
+                          <a:latin typeface="+mn-ea"/>
+                          <a:ea typeface="+mn-ea"/>
+                        </a:rPr>
+                        <a:t>☞</a:t>
+                      </a:r>
+                      <a:r>
+                        <a:rPr lang="en-US" altLang="ko-KR" sz="1200" dirty="0" smtClean="0">
+                          <a:latin typeface="+mn-ea"/>
+                          <a:ea typeface="+mn-ea"/>
+                        </a:rPr>
+                        <a:t> </a:t>
+                      </a:r>
+                      <a:r>
+                        <a:rPr lang="ko-KR" altLang="en-US" sz="1200" dirty="0" smtClean="0">
+                          <a:latin typeface="+mn-ea"/>
+                          <a:ea typeface="+mn-ea"/>
+                        </a:rPr>
+                        <a:t>좌표평면 위 음식의 신맛</a:t>
+                      </a:r>
+                      <a:r>
+                        <a:rPr lang="en-US" altLang="ko-KR" sz="1200" dirty="0" smtClean="0">
+                          <a:latin typeface="+mn-ea"/>
+                          <a:ea typeface="+mn-ea"/>
+                        </a:rPr>
+                        <a:t>(X</a:t>
+                      </a:r>
+                      <a:r>
+                        <a:rPr lang="ko-KR" altLang="en-US" sz="1200" dirty="0" smtClean="0">
+                          <a:latin typeface="+mn-ea"/>
+                          <a:ea typeface="+mn-ea"/>
+                        </a:rPr>
+                        <a:t>축</a:t>
+                      </a:r>
+                      <a:r>
+                        <a:rPr lang="en-US" altLang="ko-KR" sz="1200" dirty="0" smtClean="0">
+                          <a:latin typeface="+mn-ea"/>
+                          <a:ea typeface="+mn-ea"/>
+                        </a:rPr>
+                        <a:t>), </a:t>
+                      </a:r>
+                      <a:r>
+                        <a:rPr lang="ko-KR" altLang="en-US" sz="1200" dirty="0" smtClean="0">
+                          <a:latin typeface="+mn-ea"/>
+                          <a:ea typeface="+mn-ea"/>
+                        </a:rPr>
+                        <a:t>단맛</a:t>
+                      </a:r>
+                      <a:r>
+                        <a:rPr lang="en-US" altLang="ko-KR" sz="1200" baseline="0" dirty="0" smtClean="0">
+                          <a:latin typeface="+mn-ea"/>
+                          <a:ea typeface="+mn-ea"/>
+                        </a:rPr>
+                        <a:t>(Y</a:t>
+                      </a:r>
+                      <a:r>
+                        <a:rPr lang="ko-KR" altLang="en-US" sz="1200" baseline="0" dirty="0" smtClean="0">
+                          <a:latin typeface="+mn-ea"/>
+                          <a:ea typeface="+mn-ea"/>
+                        </a:rPr>
+                        <a:t>축</a:t>
+                      </a:r>
+                      <a:r>
+                        <a:rPr lang="en-US" altLang="ko-KR" sz="1200" baseline="0" dirty="0" smtClean="0">
+                          <a:latin typeface="+mn-ea"/>
+                          <a:ea typeface="+mn-ea"/>
+                        </a:rPr>
+                        <a:t>)</a:t>
+                      </a:r>
+                      <a:r>
+                        <a:rPr lang="ko-KR" altLang="en-US" sz="1200" baseline="0" dirty="0" smtClean="0">
+                          <a:latin typeface="+mn-ea"/>
+                          <a:ea typeface="+mn-ea"/>
+                        </a:rPr>
+                        <a:t>의</a:t>
+                      </a:r>
+                      <a:r>
+                        <a:rPr lang="en-US" altLang="ko-KR" sz="1200" dirty="0" smtClean="0">
+                          <a:latin typeface="+mn-ea"/>
+                          <a:ea typeface="+mn-ea"/>
+                        </a:rPr>
+                        <a:t> Class</a:t>
+                      </a:r>
+                      <a:r>
+                        <a:rPr lang="ko-KR" altLang="en-US" sz="1200" dirty="0" smtClean="0">
+                          <a:latin typeface="+mn-ea"/>
+                          <a:ea typeface="+mn-ea"/>
+                        </a:rPr>
+                        <a:t>가 있을 때</a:t>
+                      </a:r>
+                      <a:r>
+                        <a:rPr lang="en-US" altLang="ko-KR" sz="1200" dirty="0" smtClean="0">
+                          <a:latin typeface="+mn-ea"/>
+                          <a:ea typeface="+mn-ea"/>
+                        </a:rPr>
+                        <a:t>,</a:t>
+                      </a:r>
+                    </a:p>
+                    <a:p>
+                      <a:pPr latinLnBrk="1"/>
+                      <a:r>
+                        <a:rPr lang="en-US" altLang="ko-KR" sz="1200" dirty="0" smtClean="0">
+                          <a:latin typeface="+mn-ea"/>
+                          <a:ea typeface="+mn-ea"/>
+                        </a:rPr>
+                        <a:t>    (5,5)</a:t>
+                      </a:r>
+                      <a:r>
+                        <a:rPr lang="en-US" altLang="ko-KR" sz="1200" baseline="0" dirty="0" smtClean="0">
+                          <a:latin typeface="+mn-ea"/>
+                          <a:ea typeface="+mn-ea"/>
+                        </a:rPr>
+                        <a:t> </a:t>
+                      </a:r>
+                      <a:r>
+                        <a:rPr lang="ko-KR" altLang="en-US" sz="1200" baseline="0" dirty="0" smtClean="0">
+                          <a:latin typeface="+mn-ea"/>
+                          <a:ea typeface="+mn-ea"/>
+                        </a:rPr>
+                        <a:t>좌표를 가진 토마토는 어느 범주에 속하는지 분류</a:t>
+                      </a:r>
+                      <a:r>
+                        <a:rPr lang="ko-KR" altLang="en-US" sz="1200" dirty="0" smtClean="0">
+                          <a:latin typeface="+mn-ea"/>
+                          <a:ea typeface="+mn-ea"/>
+                        </a:rPr>
+                        <a:t> </a:t>
+                      </a:r>
+                      <a:endParaRPr lang="ko-KR" altLang="en-US" sz="1200" dirty="0">
+                        <a:latin typeface="+mn-ea"/>
+                        <a:ea typeface="+mn-ea"/>
+                      </a:endParaRPr>
+                    </a:p>
+                  </a:txBody>
+                  <a:tcPr/>
+                </a:tc>
+              </a:tr>
+              <a:tr h="370840">
+                <a:tc>
+                  <a:txBody>
+                    <a:bodyPr/>
+                    <a:lstStyle/>
+                    <a:p>
+                      <a:pPr latinLnBrk="1"/>
+                      <a:r>
+                        <a:rPr lang="en-US" altLang="ko-KR" sz="1200" dirty="0" smtClean="0">
+                          <a:latin typeface="+mn-ea"/>
+                          <a:ea typeface="+mn-ea"/>
+                        </a:rPr>
+                        <a:t>Neural Network</a:t>
+                      </a:r>
+                      <a:endParaRPr lang="ko-KR" altLang="en-US" sz="1200" dirty="0">
+                        <a:latin typeface="+mn-ea"/>
+                        <a:ea typeface="+mn-ea"/>
+                      </a:endParaRPr>
+                    </a:p>
+                  </a:txBody>
+                  <a:tcPr/>
+                </a:tc>
+                <a:tc>
+                  <a:txBody>
+                    <a:bodyPr/>
+                    <a:lstStyle/>
+                    <a:p>
+                      <a:pPr latinLnBrk="1"/>
+                      <a:r>
+                        <a:rPr lang="ko-KR" altLang="en-US" sz="1200" dirty="0" smtClean="0">
+                          <a:latin typeface="+mn-ea"/>
+                          <a:ea typeface="+mn-ea"/>
+                        </a:rPr>
+                        <a:t>입력</a:t>
+                      </a:r>
+                      <a:r>
+                        <a:rPr lang="en-US" altLang="ko-KR" sz="1200" dirty="0" smtClean="0">
+                          <a:latin typeface="+mn-ea"/>
+                          <a:ea typeface="+mn-ea"/>
+                        </a:rPr>
+                        <a:t>/</a:t>
+                      </a:r>
+                      <a:r>
+                        <a:rPr lang="ko-KR" altLang="en-US" sz="1200" dirty="0" smtClean="0">
+                          <a:latin typeface="+mn-ea"/>
+                          <a:ea typeface="+mn-ea"/>
+                        </a:rPr>
+                        <a:t>은닉</a:t>
+                      </a:r>
+                      <a:r>
+                        <a:rPr lang="en-US" altLang="ko-KR" sz="1200" dirty="0" smtClean="0">
+                          <a:latin typeface="+mn-ea"/>
+                          <a:ea typeface="+mn-ea"/>
+                        </a:rPr>
+                        <a:t>/</a:t>
+                      </a:r>
+                      <a:r>
+                        <a:rPr lang="ko-KR" altLang="en-US" sz="1200" dirty="0" err="1" smtClean="0">
+                          <a:latin typeface="+mn-ea"/>
+                          <a:ea typeface="+mn-ea"/>
+                        </a:rPr>
+                        <a:t>출력층으로</a:t>
+                      </a:r>
+                      <a:r>
+                        <a:rPr lang="ko-KR" altLang="en-US" sz="1200" dirty="0" smtClean="0">
+                          <a:latin typeface="+mn-ea"/>
+                          <a:ea typeface="+mn-ea"/>
+                        </a:rPr>
+                        <a:t> 구성된 모형으로</a:t>
+                      </a:r>
+                      <a:r>
+                        <a:rPr lang="en-US" altLang="ko-KR" sz="1200" dirty="0" smtClean="0">
+                          <a:latin typeface="+mn-ea"/>
+                          <a:ea typeface="+mn-ea"/>
+                        </a:rPr>
+                        <a:t>, </a:t>
+                      </a:r>
+                      <a:r>
+                        <a:rPr lang="ko-KR" altLang="en-US" sz="1200" dirty="0" smtClean="0">
+                          <a:latin typeface="+mn-ea"/>
+                          <a:ea typeface="+mn-ea"/>
+                        </a:rPr>
+                        <a:t>각 층을 연결하는 </a:t>
+                      </a:r>
+                      <a:r>
+                        <a:rPr lang="ko-KR" altLang="en-US" sz="1200" dirty="0" err="1" smtClean="0">
+                          <a:latin typeface="+mn-ea"/>
+                          <a:ea typeface="+mn-ea"/>
+                        </a:rPr>
+                        <a:t>노드의</a:t>
+                      </a:r>
+                      <a:endParaRPr lang="en-US" altLang="ko-KR" sz="1200" dirty="0" smtClean="0">
+                        <a:latin typeface="+mn-ea"/>
+                        <a:ea typeface="+mn-ea"/>
+                      </a:endParaRPr>
+                    </a:p>
+                    <a:p>
+                      <a:pPr latinLnBrk="1"/>
+                      <a:r>
+                        <a:rPr lang="ko-KR" altLang="en-US" sz="1200" dirty="0" smtClean="0">
+                          <a:latin typeface="+mn-ea"/>
+                          <a:ea typeface="+mn-ea"/>
+                        </a:rPr>
+                        <a:t>가중치를 업데이트하며 학습</a:t>
+                      </a:r>
+                      <a:endParaRPr lang="ko-KR" altLang="en-US" sz="1200" dirty="0">
+                        <a:latin typeface="+mn-ea"/>
+                        <a:ea typeface="+mn-ea"/>
+                      </a:endParaRPr>
+                    </a:p>
+                  </a:txBody>
+                  <a:tcPr/>
+                </a:tc>
+              </a:tr>
+              <a:tr h="370840">
+                <a:tc>
+                  <a:txBody>
+                    <a:bodyPr/>
+                    <a:lstStyle/>
+                    <a:p>
+                      <a:pPr latinLnBrk="1"/>
+                      <a:r>
+                        <a:rPr lang="en-US" altLang="ko-KR" sz="1200" dirty="0" smtClean="0">
+                          <a:latin typeface="+mn-ea"/>
+                          <a:ea typeface="+mn-ea"/>
+                        </a:rPr>
+                        <a:t>SVM(Support</a:t>
+                      </a:r>
+                      <a:r>
+                        <a:rPr lang="en-US" altLang="ko-KR" sz="1200" baseline="0" dirty="0" smtClean="0">
+                          <a:latin typeface="+mn-ea"/>
+                          <a:ea typeface="+mn-ea"/>
+                        </a:rPr>
+                        <a:t> Vector Machine) </a:t>
+                      </a:r>
+                      <a:endParaRPr lang="ko-KR" altLang="en-US" sz="1200" dirty="0">
+                        <a:latin typeface="+mn-ea"/>
+                        <a:ea typeface="+mn-ea"/>
+                      </a:endParaRPr>
+                    </a:p>
+                  </a:txBody>
+                  <a:tcPr/>
+                </a:tc>
+                <a:tc>
+                  <a:txBody>
+                    <a:bodyPr/>
+                    <a:lstStyle/>
+                    <a:p>
+                      <a:pPr latinLnBrk="1"/>
+                      <a:r>
+                        <a:rPr lang="en-US" altLang="ko-KR" sz="1200" dirty="0" smtClean="0">
+                          <a:latin typeface="+mn-ea"/>
+                          <a:ea typeface="+mn-ea"/>
+                        </a:rPr>
+                        <a:t>Class</a:t>
+                      </a:r>
+                      <a:r>
+                        <a:rPr lang="en-US" altLang="ko-KR" sz="1200" baseline="0" dirty="0" smtClean="0">
+                          <a:latin typeface="+mn-ea"/>
+                          <a:ea typeface="+mn-ea"/>
+                        </a:rPr>
+                        <a:t> </a:t>
+                      </a:r>
+                      <a:r>
+                        <a:rPr lang="ko-KR" altLang="en-US" sz="1200" baseline="0" dirty="0" smtClean="0">
+                          <a:latin typeface="+mn-ea"/>
+                          <a:ea typeface="+mn-ea"/>
+                        </a:rPr>
+                        <a:t>간 거리</a:t>
+                      </a:r>
+                      <a:r>
+                        <a:rPr lang="en-US" altLang="ko-KR" sz="1200" baseline="0" dirty="0" smtClean="0">
+                          <a:latin typeface="+mn-ea"/>
+                          <a:ea typeface="+mn-ea"/>
+                        </a:rPr>
+                        <a:t>(Margin)</a:t>
+                      </a:r>
+                      <a:r>
+                        <a:rPr lang="ko-KR" altLang="en-US" sz="1200" baseline="0" dirty="0" smtClean="0">
+                          <a:latin typeface="+mn-ea"/>
+                          <a:ea typeface="+mn-ea"/>
+                        </a:rPr>
+                        <a:t>가 최대가 되도록</a:t>
+                      </a:r>
+                      <a:r>
+                        <a:rPr lang="en-US" altLang="ko-KR" sz="1200" baseline="0" dirty="0" smtClean="0">
+                          <a:latin typeface="+mn-ea"/>
+                          <a:ea typeface="+mn-ea"/>
+                        </a:rPr>
+                        <a:t> </a:t>
+                      </a:r>
+                      <a:r>
+                        <a:rPr lang="ko-KR" altLang="en-US" sz="1200" baseline="0" dirty="0" smtClean="0">
+                          <a:latin typeface="+mn-ea"/>
+                          <a:ea typeface="+mn-ea"/>
+                        </a:rPr>
+                        <a:t>결정 경계</a:t>
+                      </a:r>
+                      <a:r>
+                        <a:rPr lang="en-US" altLang="ko-KR" sz="1200" baseline="0" dirty="0" smtClean="0">
+                          <a:latin typeface="+mn-ea"/>
+                          <a:ea typeface="+mn-ea"/>
+                        </a:rPr>
+                        <a:t>(Decision Boundary), </a:t>
+                      </a:r>
+                      <a:r>
+                        <a:rPr lang="ko-KR" altLang="en-US" sz="1200" baseline="0" dirty="0" smtClean="0">
+                          <a:latin typeface="+mn-ea"/>
+                          <a:ea typeface="+mn-ea"/>
+                        </a:rPr>
+                        <a:t>즉 분류를 위한 기준선을 정의</a:t>
+                      </a:r>
+                      <a:endParaRPr lang="en-US" altLang="ko-KR" sz="1200" baseline="0" dirty="0" smtClean="0">
+                        <a:latin typeface="+mn-ea"/>
+                        <a:ea typeface="+mn-ea"/>
+                      </a:endParaRPr>
+                    </a:p>
+                  </a:txBody>
+                  <a:tcPr/>
+                </a:tc>
+              </a:tr>
+              <a:tr h="370840">
+                <a:tc>
+                  <a:txBody>
+                    <a:bodyPr/>
+                    <a:lstStyle/>
+                    <a:p>
+                      <a:pPr latinLnBrk="1"/>
+                      <a:r>
+                        <a:rPr lang="en-US" altLang="ko-KR" sz="1200" dirty="0" smtClean="0">
+                          <a:latin typeface="+mn-ea"/>
+                          <a:ea typeface="+mn-ea"/>
+                        </a:rPr>
+                        <a:t>Ensemble Learning</a:t>
+                      </a:r>
+                      <a:endParaRPr lang="ko-KR" altLang="en-US" sz="1200" dirty="0">
+                        <a:latin typeface="+mn-ea"/>
+                        <a:ea typeface="+mn-ea"/>
+                      </a:endParaRPr>
+                    </a:p>
+                  </a:txBody>
+                  <a:tcPr/>
+                </a:tc>
+                <a:tc>
+                  <a:txBody>
+                    <a:bodyPr/>
+                    <a:lstStyle/>
+                    <a:p>
+                      <a:pPr latinLnBrk="1"/>
+                      <a:r>
+                        <a:rPr lang="ko-KR" altLang="en-US" sz="1200" dirty="0" smtClean="0">
+                          <a:latin typeface="+mn-ea"/>
+                          <a:ea typeface="+mn-ea"/>
+                        </a:rPr>
+                        <a:t>여러 개의 모델을 결합 하여 사용하는 모델</a:t>
+                      </a:r>
+                      <a:endParaRPr lang="ko-KR" altLang="en-US" sz="1200" dirty="0">
+                        <a:latin typeface="+mn-ea"/>
+                        <a:ea typeface="+mn-ea"/>
+                      </a:endParaRPr>
+                    </a:p>
+                  </a:txBody>
+                  <a:tcPr/>
+                </a:tc>
+              </a:tr>
+              <a:tr h="370840">
+                <a:tc>
+                  <a:txBody>
+                    <a:bodyPr/>
+                    <a:lstStyle/>
+                    <a:p>
+                      <a:pPr latinLnBrk="1"/>
+                      <a:r>
+                        <a:rPr lang="en-US" altLang="ko-KR" sz="1200" dirty="0" smtClean="0">
+                          <a:latin typeface="+mn-ea"/>
+                          <a:ea typeface="+mn-ea"/>
+                        </a:rPr>
+                        <a:t>K-means Clustering</a:t>
+                      </a:r>
+                      <a:endParaRPr lang="ko-KR" altLang="en-US" sz="1200" dirty="0">
+                        <a:latin typeface="+mn-ea"/>
+                        <a:ea typeface="+mn-ea"/>
+                      </a:endParaRPr>
+                    </a:p>
+                  </a:txBody>
+                  <a:tcPr/>
+                </a:tc>
+                <a:tc>
+                  <a:txBody>
+                    <a:bodyPr/>
+                    <a:lstStyle/>
+                    <a:p>
+                      <a:pPr latinLnBrk="1"/>
+                      <a:r>
+                        <a:rPr lang="ko-KR" altLang="en-US" sz="1200" dirty="0" smtClean="0">
+                          <a:latin typeface="+mn-ea"/>
+                          <a:ea typeface="+mn-ea"/>
+                        </a:rPr>
+                        <a:t>서로 유사한 관찰치를 그룹으로 묶어</a:t>
+                      </a:r>
+                      <a:r>
+                        <a:rPr lang="en-US" altLang="ko-KR" sz="1200" dirty="0" smtClean="0">
+                          <a:latin typeface="+mn-ea"/>
+                          <a:ea typeface="+mn-ea"/>
+                        </a:rPr>
+                        <a:t>, K</a:t>
+                      </a:r>
+                      <a:r>
+                        <a:rPr lang="ko-KR" altLang="en-US" sz="1200" dirty="0" smtClean="0">
+                          <a:latin typeface="+mn-ea"/>
+                          <a:ea typeface="+mn-ea"/>
+                        </a:rPr>
+                        <a:t>개</a:t>
+                      </a:r>
+                      <a:r>
+                        <a:rPr lang="ko-KR" altLang="en-US" sz="1200" baseline="0" dirty="0" smtClean="0">
+                          <a:latin typeface="+mn-ea"/>
+                          <a:ea typeface="+mn-ea"/>
+                        </a:rPr>
+                        <a:t>의 </a:t>
+                      </a:r>
+                      <a:r>
+                        <a:rPr lang="ko-KR" altLang="en-US" sz="1200" dirty="0" smtClean="0">
+                          <a:latin typeface="+mn-ea"/>
+                          <a:ea typeface="+mn-ea"/>
+                        </a:rPr>
+                        <a:t>군집</a:t>
+                      </a:r>
+                      <a:r>
+                        <a:rPr lang="en-US" altLang="ko-KR" sz="1200" dirty="0" smtClean="0">
+                          <a:latin typeface="+mn-ea"/>
+                          <a:ea typeface="+mn-ea"/>
+                        </a:rPr>
+                        <a:t>(cluster)</a:t>
+                      </a:r>
+                      <a:r>
+                        <a:rPr lang="ko-KR" altLang="en-US" sz="1200" dirty="0" smtClean="0">
+                          <a:latin typeface="+mn-ea"/>
+                          <a:ea typeface="+mn-ea"/>
+                        </a:rPr>
+                        <a:t>를 찾아내는 것</a:t>
+                      </a:r>
+                      <a:endParaRPr lang="en-US" altLang="ko-KR" sz="1200" dirty="0" smtClean="0">
+                        <a:latin typeface="+mn-ea"/>
+                        <a:ea typeface="+mn-ea"/>
+                      </a:endParaRPr>
+                    </a:p>
+                  </a:txBody>
+                  <a:tcPr/>
+                </a:tc>
+              </a:tr>
+            </a:tbl>
+          </a:graphicData>
+        </a:graphic>
+      </p:graphicFrame>
+    </p:spTree>
+    <p:extLst>
+      <p:ext uri="{BB962C8B-B14F-4D97-AF65-F5344CB8AC3E}">
+        <p14:creationId xmlns:p14="http://schemas.microsoft.com/office/powerpoint/2010/main" val="4221346138"/>
       </p:ext>
     </p:extLst>
   </p:cSld>

</xml_diff>